<commit_message>
correcting Kubernetes at war on Azure.pptx
</commit_message>
<xml_diff>
--- a/examples/atwar/presentation/Kubernetes at war on Azure.pptx
+++ b/examples/atwar/presentation/Kubernetes at war on Azure.pptx
@@ -5272,11 +5272,7 @@
             </a:r>
             <a:r>
               <a:rPr lang="pl-PL" dirty="0" smtClean="0"/>
-              <a:t> </a:t>
-            </a:r>
-            <a:r>
-              <a:rPr lang="pl-PL" dirty="0" smtClean="0"/>
-              <a:t>(</a:t>
+              <a:t> (</a:t>
             </a:r>
             <a:r>
               <a:rPr lang="pl-PL" dirty="0" err="1"/>
@@ -6152,16 +6148,10 @@
           <a:lstStyle/>
           <a:p>
             <a:r>
-              <a:rPr lang="pl-PL" dirty="0">
+              <a:rPr lang="pl-PL" smtClean="0">
                 <a:hlinkClick r:id="rId2"/>
               </a:rPr>
-              <a:t>https://</a:t>
-            </a:r>
-            <a:r>
-              <a:rPr lang="pl-PL" dirty="0" smtClean="0">
-                <a:hlinkClick r:id="rId2"/>
-              </a:rPr>
-              <a:t>www.youtube.com/watch?v=PH-2FfFD2P</a:t>
+              <a:t>https://www.youtube.com/watch?v=PH-2FfFD2PU</a:t>
             </a:r>
             <a:endParaRPr lang="pl-PL" dirty="0" smtClean="0"/>
           </a:p>
@@ -6328,11 +6318,19 @@
               <a:buNone/>
             </a:pPr>
             <a:r>
-              <a:rPr lang="en-US" dirty="0" smtClean="0"/>
+              <a:rPr lang="en-US" dirty="0" smtClean="0">
+                <a:solidFill>
+                  <a:srgbClr val="FF0000"/>
+                </a:solidFill>
+              </a:rPr>
               <a:t>2- </a:t>
             </a:r>
             <a:r>
-              <a:rPr lang="en-US" dirty="0"/>
+              <a:rPr lang="en-US" dirty="0">
+                <a:solidFill>
+                  <a:srgbClr val="FF0000"/>
+                </a:solidFill>
+              </a:rPr>
               <a:t>A node dies</a:t>
             </a:r>
           </a:p>
@@ -6783,6 +6781,13 @@
   <p:clrMapOvr>
     <a:masterClrMapping/>
   </p:clrMapOvr>
+  <p:timing>
+    <p:tnLst>
+      <p:par>
+        <p:cTn id="1" dur="indefinite" restart="never" nodeType="tmRoot"/>
+      </p:par>
+    </p:tnLst>
+  </p:timing>
 </p:sld>
 </file>
 
@@ -6853,13 +6858,36 @@
           <a:p>
             <a:r>
               <a:rPr lang="en-US" dirty="0"/>
-              <a:t>Kubernetes employs requests and limits to control resources. Requests are guaranteed resources that a container is entitled to use. Limits, on the other hand, are the maximum resources or threshold a container can use. After reaching the limits, containers will be restricted. If a container requests a resource, Kubernetes will only schedule it on an available node that can provide those resources. These resources and limit are defined in the standard YAML configuration of your containers.</a:t>
-            </a:r>
-          </a:p>
-          <a:p>
+              <a:t>Kubernetes employs requests and limits to control resources. Requests are guaranteed resources that a container is entitled to use. Limits, on the other hand, are the maximum resources or threshold a container can use. </a:t>
+            </a:r>
+            <a:endParaRPr lang="pl-PL" dirty="0" smtClean="0"/>
+          </a:p>
+          <a:p>
+            <a:r>
+              <a:rPr lang="en-US" dirty="0" smtClean="0"/>
+              <a:t>After </a:t>
+            </a:r>
             <a:r>
               <a:rPr lang="en-US" dirty="0"/>
-              <a:t>In Kubernetes, there are two types of resources: CPU and Memory. CPU is measured in core units, and memory is specified in bytes.</a:t>
+              <a:t>reaching the limits, containers will be restricted. If a container requests a resource, Kubernetes will only schedule it on an available node that can provide those resources. These resources and limit are defined in the standard YAML configuration of your containers.</a:t>
+            </a:r>
+          </a:p>
+          <a:p>
+            <a:r>
+              <a:rPr lang="en-US" dirty="0"/>
+              <a:t>In Kubernetes, there are two types of resources: </a:t>
+            </a:r>
+            <a:r>
+              <a:rPr lang="en-US" dirty="0">
+                <a:solidFill>
+                  <a:srgbClr val="FF0000"/>
+                </a:solidFill>
+              </a:rPr>
+              <a:t>CPU and Memory</a:t>
+            </a:r>
+            <a:r>
+              <a:rPr lang="en-US" dirty="0"/>
+              <a:t>. CPU is measured in core units, and memory is specified in bytes.</a:t>
             </a:r>
           </a:p>
           <a:p>
@@ -6920,8 +6948,12 @@
           <a:lstStyle/>
           <a:p>
             <a:r>
+              <a:rPr lang="pl-PL" dirty="0" err="1" smtClean="0"/>
+              <a:t>Container</a:t>
+            </a:r>
+            <a:r>
               <a:rPr lang="pl-PL" dirty="0" smtClean="0"/>
-              <a:t>Pod </a:t>
+              <a:t> </a:t>
             </a:r>
             <a:r>
               <a:rPr lang="pl-PL" dirty="0" err="1" smtClean="0"/>
@@ -7371,7 +7403,7 @@
           </a:p>
           <a:p>
             <a:r>
-              <a:rPr lang="pl-PL" dirty="0">
+              <a:rPr lang="pl-PL" b="1" dirty="0">
                 <a:solidFill>
                   <a:schemeClr val="accent4">
                     <a:lumMod val="50000"/>
@@ -7381,7 +7413,7 @@
               <a:t>    </a:t>
             </a:r>
             <a:r>
-              <a:rPr lang="pl-PL" dirty="0" err="1">
+              <a:rPr lang="pl-PL" b="1" dirty="0" err="1">
                 <a:solidFill>
                   <a:schemeClr val="accent4">
                     <a:lumMod val="50000"/>
@@ -7391,7 +7423,7 @@
               <a:t>resources</a:t>
             </a:r>
             <a:r>
-              <a:rPr lang="pl-PL" dirty="0">
+              <a:rPr lang="pl-PL" b="1" dirty="0">
                 <a:solidFill>
                   <a:schemeClr val="accent4">
                     <a:lumMod val="50000"/>
@@ -7403,7 +7435,7 @@
           </a:p>
           <a:p>
             <a:r>
-              <a:rPr lang="pl-PL" dirty="0">
+              <a:rPr lang="pl-PL" b="1" dirty="0">
                 <a:solidFill>
                   <a:schemeClr val="accent4">
                     <a:lumMod val="50000"/>
@@ -7413,7 +7445,7 @@
               <a:t>      </a:t>
             </a:r>
             <a:r>
-              <a:rPr lang="pl-PL" dirty="0" err="1">
+              <a:rPr lang="pl-PL" b="1" dirty="0" err="1">
                 <a:solidFill>
                   <a:schemeClr val="accent4">
                     <a:lumMod val="50000"/>
@@ -7423,7 +7455,7 @@
               <a:t>limits</a:t>
             </a:r>
             <a:r>
-              <a:rPr lang="pl-PL" dirty="0">
+              <a:rPr lang="pl-PL" b="1" dirty="0">
                 <a:solidFill>
                   <a:schemeClr val="accent4">
                     <a:lumMod val="50000"/>
@@ -7435,7 +7467,7 @@
           </a:p>
           <a:p>
             <a:r>
-              <a:rPr lang="pl-PL" dirty="0">
+              <a:rPr lang="pl-PL" b="1" dirty="0">
                 <a:solidFill>
                   <a:schemeClr val="accent4">
                     <a:lumMod val="50000"/>
@@ -7445,7 +7477,7 @@
               <a:t>        </a:t>
             </a:r>
             <a:r>
-              <a:rPr lang="pl-PL" dirty="0" err="1">
+              <a:rPr lang="pl-PL" b="1" dirty="0" err="1">
                 <a:solidFill>
                   <a:schemeClr val="accent4">
                     <a:lumMod val="50000"/>
@@ -7455,7 +7487,7 @@
               <a:t>memory</a:t>
             </a:r>
             <a:r>
-              <a:rPr lang="pl-PL" dirty="0">
+              <a:rPr lang="pl-PL" b="1" dirty="0">
                 <a:solidFill>
                   <a:schemeClr val="accent4">
                     <a:lumMod val="50000"/>
@@ -7467,7 +7499,7 @@
           </a:p>
           <a:p>
             <a:r>
-              <a:rPr lang="pl-PL" dirty="0">
+              <a:rPr lang="pl-PL" b="1" dirty="0">
                 <a:solidFill>
                   <a:schemeClr val="accent4">
                     <a:lumMod val="50000"/>
@@ -7477,7 +7509,7 @@
               <a:t>        </a:t>
             </a:r>
             <a:r>
-              <a:rPr lang="pl-PL" dirty="0" err="1">
+              <a:rPr lang="pl-PL" b="1" dirty="0" err="1">
                 <a:solidFill>
                   <a:schemeClr val="accent4">
                     <a:lumMod val="50000"/>
@@ -7487,7 +7519,7 @@
               <a:t>cpu</a:t>
             </a:r>
             <a:r>
-              <a:rPr lang="pl-PL" dirty="0">
+              <a:rPr lang="pl-PL" b="1" dirty="0">
                 <a:solidFill>
                   <a:schemeClr val="accent4">
                     <a:lumMod val="50000"/>
@@ -7499,7 +7531,7 @@
           </a:p>
           <a:p>
             <a:r>
-              <a:rPr lang="pl-PL" dirty="0">
+              <a:rPr lang="pl-PL" b="1" dirty="0">
                 <a:solidFill>
                   <a:schemeClr val="accent4">
                     <a:lumMod val="50000"/>
@@ -7509,7 +7541,7 @@
               <a:t>      </a:t>
             </a:r>
             <a:r>
-              <a:rPr lang="pl-PL" dirty="0" err="1">
+              <a:rPr lang="pl-PL" b="1" dirty="0" err="1">
                 <a:solidFill>
                   <a:schemeClr val="accent4">
                     <a:lumMod val="50000"/>
@@ -7519,7 +7551,7 @@
               <a:t>requests</a:t>
             </a:r>
             <a:r>
-              <a:rPr lang="pl-PL" dirty="0">
+              <a:rPr lang="pl-PL" b="1" dirty="0">
                 <a:solidFill>
                   <a:schemeClr val="accent4">
                     <a:lumMod val="50000"/>
@@ -7531,7 +7563,7 @@
           </a:p>
           <a:p>
             <a:r>
-              <a:rPr lang="pl-PL" dirty="0">
+              <a:rPr lang="pl-PL" b="1" dirty="0">
                 <a:solidFill>
                   <a:schemeClr val="accent4">
                     <a:lumMod val="50000"/>
@@ -7541,7 +7573,7 @@
               <a:t>        </a:t>
             </a:r>
             <a:r>
-              <a:rPr lang="pl-PL" dirty="0" err="1">
+              <a:rPr lang="pl-PL" b="1" dirty="0" err="1">
                 <a:solidFill>
                   <a:schemeClr val="accent4">
                     <a:lumMod val="50000"/>
@@ -7551,7 +7583,7 @@
               <a:t>memory</a:t>
             </a:r>
             <a:r>
-              <a:rPr lang="pl-PL" dirty="0">
+              <a:rPr lang="pl-PL" b="1" dirty="0">
                 <a:solidFill>
                   <a:schemeClr val="accent4">
                     <a:lumMod val="50000"/>
@@ -7563,7 +7595,7 @@
           </a:p>
           <a:p>
             <a:r>
-              <a:rPr lang="pl-PL" dirty="0">
+              <a:rPr lang="pl-PL" b="1" dirty="0">
                 <a:solidFill>
                   <a:schemeClr val="accent4">
                     <a:lumMod val="50000"/>
@@ -7573,7 +7605,7 @@
               <a:t>        </a:t>
             </a:r>
             <a:r>
-              <a:rPr lang="pl-PL" dirty="0" err="1">
+              <a:rPr lang="pl-PL" b="1" dirty="0" err="1">
                 <a:solidFill>
                   <a:schemeClr val="accent4">
                     <a:lumMod val="50000"/>
@@ -7583,7 +7615,7 @@
               <a:t>cpu</a:t>
             </a:r>
             <a:r>
-              <a:rPr lang="pl-PL" dirty="0">
+              <a:rPr lang="pl-PL" b="1" dirty="0">
                 <a:solidFill>
                   <a:schemeClr val="accent4">
                     <a:lumMod val="50000"/>
@@ -7611,6 +7643,13 @@
   <p:clrMapOvr>
     <a:masterClrMapping/>
   </p:clrMapOvr>
+  <p:timing>
+    <p:tnLst>
+      <p:par>
+        <p:cTn id="1" dur="indefinite" restart="never" nodeType="tmRoot"/>
+      </p:par>
+    </p:tnLst>
+  </p:timing>
 </p:sld>
 </file>
 
@@ -8563,18 +8602,34 @@
               <a:t>    </a:t>
             </a:r>
             <a:r>
-              <a:rPr lang="pl-PL" dirty="0" err="1"/>
+              <a:rPr lang="pl-PL" dirty="0" err="1">
+                <a:solidFill>
+                  <a:srgbClr val="FF0000"/>
+                </a:solidFill>
+              </a:rPr>
               <a:t>type</a:t>
             </a:r>
             <a:r>
-              <a:rPr lang="pl-PL" dirty="0"/>
+              <a:rPr lang="pl-PL" dirty="0">
+                <a:solidFill>
+                  <a:srgbClr val="FF0000"/>
+                </a:solidFill>
+              </a:rPr>
               <a:t>: </a:t>
             </a:r>
             <a:r>
-              <a:rPr lang="pl-PL" dirty="0" err="1"/>
+              <a:rPr lang="pl-PL" dirty="0" err="1">
+                <a:solidFill>
+                  <a:srgbClr val="FF0000"/>
+                </a:solidFill>
+              </a:rPr>
               <a:t>Container</a:t>
             </a:r>
-            <a:endParaRPr lang="pl-PL" dirty="0"/>
+            <a:endParaRPr lang="pl-PL" dirty="0">
+              <a:solidFill>
+                <a:srgbClr val="FF0000"/>
+              </a:solidFill>
+            </a:endParaRPr>
           </a:p>
         </p:txBody>
       </p:sp>

</xml_diff>

<commit_message>
corecting  order of pages
</commit_message>
<xml_diff>
--- a/examples/atwar/presentation/Kubernetes at war on Azure.pptx
+++ b/examples/atwar/presentation/Kubernetes at war on Azure.pptx
@@ -11,15 +11,15 @@
     <p:sldId id="281" r:id="rId5"/>
     <p:sldId id="275" r:id="rId6"/>
     <p:sldId id="258" r:id="rId7"/>
-    <p:sldId id="279" r:id="rId8"/>
-    <p:sldId id="266" r:id="rId9"/>
-    <p:sldId id="265" r:id="rId10"/>
-    <p:sldId id="257" r:id="rId11"/>
-    <p:sldId id="276" r:id="rId12"/>
-    <p:sldId id="270" r:id="rId13"/>
-    <p:sldId id="267" r:id="rId14"/>
-    <p:sldId id="262" r:id="rId15"/>
-    <p:sldId id="263" r:id="rId16"/>
+    <p:sldId id="262" r:id="rId8"/>
+    <p:sldId id="263" r:id="rId9"/>
+    <p:sldId id="279" r:id="rId10"/>
+    <p:sldId id="266" r:id="rId11"/>
+    <p:sldId id="265" r:id="rId12"/>
+    <p:sldId id="257" r:id="rId13"/>
+    <p:sldId id="276" r:id="rId14"/>
+    <p:sldId id="270" r:id="rId15"/>
+    <p:sldId id="267" r:id="rId16"/>
     <p:sldId id="261" r:id="rId17"/>
     <p:sldId id="269" r:id="rId18"/>
     <p:sldId id="278" r:id="rId19"/>
@@ -4007,12 +4007,16 @@
           <a:lstStyle/>
           <a:p>
             <a:r>
+              <a:rPr lang="pl-PL" dirty="0" err="1" smtClean="0"/>
+              <a:t>Container</a:t>
+            </a:r>
+            <a:r>
               <a:rPr lang="pl-PL" dirty="0" smtClean="0"/>
-              <a:t>Resource </a:t>
+              <a:t> </a:t>
             </a:r>
             <a:r>
               <a:rPr lang="pl-PL" dirty="0" err="1" smtClean="0"/>
-              <a:t>quota</a:t>
+              <a:t>limits</a:t>
             </a:r>
             <a:endParaRPr lang="pl-PL" dirty="0"/>
           </a:p>
@@ -4020,384 +4024,678 @@
       </p:sp>
       <p:sp>
         <p:nvSpPr>
-          <p:cNvPr id="4" name="Prostokąt 3"/>
+          <p:cNvPr id="3" name="Symbol zastępczy zawartości 2"/>
+          <p:cNvSpPr>
+            <a:spLocks noGrp="1"/>
+          </p:cNvSpPr>
+          <p:nvPr>
+            <p:ph idx="1"/>
+          </p:nvPr>
+        </p:nvSpPr>
+        <p:spPr>
+          <a:xfrm>
+            <a:off x="502920" y="530352"/>
+            <a:ext cx="4069080" cy="3258688"/>
+          </a:xfrm>
+        </p:spPr>
+        <p:txBody>
+          <a:bodyPr>
+            <a:normAutofit/>
+          </a:bodyPr>
+          <a:lstStyle/>
+          <a:p>
+            <a:pPr marL="0" indent="0">
+              <a:buNone/>
+            </a:pPr>
+            <a:r>
+              <a:rPr lang="pl-PL" sz="1900" dirty="0" err="1">
+                <a:solidFill>
+                  <a:srgbClr val="FF0000"/>
+                </a:solidFill>
+              </a:rPr>
+              <a:t>apiVersion</a:t>
+            </a:r>
+            <a:r>
+              <a:rPr lang="pl-PL" sz="1900" dirty="0">
+                <a:solidFill>
+                  <a:srgbClr val="FF0000"/>
+                </a:solidFill>
+              </a:rPr>
+              <a:t>: v1</a:t>
+            </a:r>
+          </a:p>
+          <a:p>
+            <a:pPr marL="0" indent="0">
+              <a:buNone/>
+            </a:pPr>
+            <a:r>
+              <a:rPr lang="pl-PL" sz="1900" dirty="0" err="1">
+                <a:solidFill>
+                  <a:srgbClr val="FF0000"/>
+                </a:solidFill>
+              </a:rPr>
+              <a:t>kind</a:t>
+            </a:r>
+            <a:r>
+              <a:rPr lang="pl-PL" sz="1900" dirty="0">
+                <a:solidFill>
+                  <a:srgbClr val="FF0000"/>
+                </a:solidFill>
+              </a:rPr>
+              <a:t>: Pod</a:t>
+            </a:r>
+          </a:p>
+          <a:p>
+            <a:pPr marL="0" indent="0">
+              <a:buNone/>
+            </a:pPr>
+            <a:r>
+              <a:rPr lang="pl-PL" sz="1900" dirty="0" err="1">
+                <a:solidFill>
+                  <a:srgbClr val="FF0000"/>
+                </a:solidFill>
+              </a:rPr>
+              <a:t>metadata</a:t>
+            </a:r>
+            <a:r>
+              <a:rPr lang="pl-PL" sz="1900" dirty="0">
+                <a:solidFill>
+                  <a:srgbClr val="FF0000"/>
+                </a:solidFill>
+              </a:rPr>
+              <a:t>:</a:t>
+            </a:r>
+          </a:p>
+          <a:p>
+            <a:pPr marL="0" indent="0">
+              <a:buNone/>
+            </a:pPr>
+            <a:r>
+              <a:rPr lang="pl-PL" sz="1900" dirty="0">
+                <a:solidFill>
+                  <a:srgbClr val="FF0000"/>
+                </a:solidFill>
+              </a:rPr>
+              <a:t>  </a:t>
+            </a:r>
+            <a:r>
+              <a:rPr lang="pl-PL" sz="1900" dirty="0" err="1">
+                <a:solidFill>
+                  <a:srgbClr val="FF0000"/>
+                </a:solidFill>
+              </a:rPr>
+              <a:t>name</a:t>
+            </a:r>
+            <a:r>
+              <a:rPr lang="pl-PL" sz="1900" dirty="0">
+                <a:solidFill>
+                  <a:srgbClr val="FF0000"/>
+                </a:solidFill>
+              </a:rPr>
+              <a:t>: pod-quota-1</a:t>
+            </a:r>
+          </a:p>
+          <a:p>
+            <a:pPr marL="0" indent="0">
+              <a:buNone/>
+            </a:pPr>
+            <a:r>
+              <a:rPr lang="pl-PL" sz="1900" dirty="0">
+                <a:solidFill>
+                  <a:srgbClr val="FF0000"/>
+                </a:solidFill>
+              </a:rPr>
+              <a:t>spec:</a:t>
+            </a:r>
+          </a:p>
+          <a:p>
+            <a:pPr marL="0" indent="0">
+              <a:buNone/>
+            </a:pPr>
+            <a:r>
+              <a:rPr lang="pl-PL" sz="1900" dirty="0">
+                <a:solidFill>
+                  <a:srgbClr val="FF0000"/>
+                </a:solidFill>
+              </a:rPr>
+              <a:t>  </a:t>
+            </a:r>
+            <a:r>
+              <a:rPr lang="pl-PL" sz="1900" dirty="0" err="1">
+                <a:solidFill>
+                  <a:srgbClr val="FF0000"/>
+                </a:solidFill>
+              </a:rPr>
+              <a:t>containers</a:t>
+            </a:r>
+            <a:r>
+              <a:rPr lang="pl-PL" sz="1900" dirty="0">
+                <a:solidFill>
+                  <a:srgbClr val="FF0000"/>
+                </a:solidFill>
+              </a:rPr>
+              <a:t>:</a:t>
+            </a:r>
+          </a:p>
+          <a:p>
+            <a:pPr marL="0" indent="0">
+              <a:buNone/>
+            </a:pPr>
+            <a:r>
+              <a:rPr lang="pl-PL" sz="1900" dirty="0">
+                <a:solidFill>
+                  <a:srgbClr val="FF0000"/>
+                </a:solidFill>
+              </a:rPr>
+              <a:t>  - </a:t>
+            </a:r>
+            <a:r>
+              <a:rPr lang="pl-PL" sz="1900" dirty="0" err="1">
+                <a:solidFill>
+                  <a:srgbClr val="FF0000"/>
+                </a:solidFill>
+              </a:rPr>
+              <a:t>name</a:t>
+            </a:r>
+            <a:r>
+              <a:rPr lang="pl-PL" sz="1900" dirty="0">
+                <a:solidFill>
+                  <a:srgbClr val="FF0000"/>
+                </a:solidFill>
+              </a:rPr>
+              <a:t>: pod-quota-1</a:t>
+            </a:r>
+          </a:p>
+          <a:p>
+            <a:pPr marL="0" indent="0">
+              <a:buNone/>
+            </a:pPr>
+            <a:r>
+              <a:rPr lang="pl-PL" sz="1900" dirty="0">
+                <a:solidFill>
+                  <a:srgbClr val="FF0000"/>
+                </a:solidFill>
+              </a:rPr>
+              <a:t>    image: </a:t>
+            </a:r>
+            <a:r>
+              <a:rPr lang="pl-PL" sz="1900" dirty="0" err="1" smtClean="0">
+                <a:solidFill>
+                  <a:srgbClr val="FF0000"/>
+                </a:solidFill>
+              </a:rPr>
+              <a:t>nginx</a:t>
+            </a:r>
+            <a:endParaRPr lang="pl-PL" sz="1900" dirty="0" smtClean="0">
+              <a:solidFill>
+                <a:srgbClr val="FF0000"/>
+              </a:solidFill>
+            </a:endParaRPr>
+          </a:p>
+          <a:p>
+            <a:endParaRPr lang="pl-PL" dirty="0"/>
+          </a:p>
+        </p:txBody>
+      </p:sp>
+      <p:sp>
+        <p:nvSpPr>
+          <p:cNvPr id="6" name="Prostokąt 5"/>
           <p:cNvSpPr/>
           <p:nvPr/>
         </p:nvSpPr>
         <p:spPr>
           <a:xfrm>
-            <a:off x="755576" y="4725144"/>
-            <a:ext cx="6912768" cy="646331"/>
+            <a:off x="4139952" y="692696"/>
+            <a:ext cx="4572000" cy="4524315"/>
           </a:xfrm>
           <a:prstGeom prst="rect">
             <a:avLst/>
           </a:prstGeom>
         </p:spPr>
         <p:txBody>
-          <a:bodyPr wrap="square">
+          <a:bodyPr>
             <a:spAutoFit/>
           </a:bodyPr>
           <a:lstStyle/>
           <a:p>
             <a:r>
+              <a:rPr lang="pl-PL" dirty="0" err="1">
+                <a:solidFill>
+                  <a:schemeClr val="accent4">
+                    <a:lumMod val="50000"/>
+                  </a:schemeClr>
+                </a:solidFill>
+              </a:rPr>
+              <a:t>apiVersion</a:t>
+            </a:r>
+            <a:r>
               <a:rPr lang="pl-PL" dirty="0">
-                <a:hlinkClick r:id="rId2"/>
-              </a:rPr>
-              <a:t>https://github.com/djkormo/k8s-AKS-primer/tree/master/examples/quotas</a:t>
-            </a:r>
-            <a:endParaRPr lang="pl-PL" dirty="0"/>
-          </a:p>
-        </p:txBody>
-      </p:sp>
-      <p:sp>
-        <p:nvSpPr>
-          <p:cNvPr id="5" name="Symbol zastępczy zawartości 4"/>
-          <p:cNvSpPr>
-            <a:spLocks noGrp="1"/>
-          </p:cNvSpPr>
-          <p:nvPr>
-            <p:ph idx="1"/>
-          </p:nvPr>
-        </p:nvSpPr>
-        <p:spPr/>
-        <p:txBody>
-          <a:bodyPr>
-            <a:normAutofit fontScale="85000" lnSpcReduction="20000"/>
-          </a:bodyPr>
-          <a:lstStyle/>
-          <a:p>
-            <a:pPr marL="0" indent="0">
-              <a:buNone/>
-            </a:pPr>
-            <a:r>
-              <a:rPr lang="pl-PL" dirty="0" err="1" smtClean="0">
-                <a:solidFill>
-                  <a:srgbClr val="FF0000"/>
-                </a:solidFill>
-              </a:rPr>
-              <a:t>apiVersion</a:t>
-            </a:r>
-            <a:r>
-              <a:rPr lang="pl-PL" dirty="0" smtClean="0">
-                <a:solidFill>
-                  <a:srgbClr val="FF0000"/>
+                <a:solidFill>
+                  <a:schemeClr val="accent4">
+                    <a:lumMod val="50000"/>
+                  </a:schemeClr>
                 </a:solidFill>
               </a:rPr>
               <a:t>: v1</a:t>
             </a:r>
           </a:p>
           <a:p>
-            <a:pPr marL="0" indent="0">
-              <a:buNone/>
-            </a:pPr>
-            <a:r>
-              <a:rPr lang="pl-PL" dirty="0" err="1" smtClean="0">
-                <a:solidFill>
-                  <a:srgbClr val="FF0000"/>
+            <a:r>
+              <a:rPr lang="pl-PL" dirty="0" err="1">
+                <a:solidFill>
+                  <a:schemeClr val="accent4">
+                    <a:lumMod val="50000"/>
+                  </a:schemeClr>
                 </a:solidFill>
               </a:rPr>
               <a:t>kind</a:t>
             </a:r>
             <a:r>
-              <a:rPr lang="pl-PL" dirty="0" smtClean="0">
-                <a:solidFill>
-                  <a:srgbClr val="FF0000"/>
-                </a:solidFill>
-              </a:rPr>
-              <a:t>: </a:t>
-            </a:r>
-            <a:r>
-              <a:rPr lang="pl-PL" dirty="0" err="1" smtClean="0">
-                <a:solidFill>
-                  <a:srgbClr val="FF0000"/>
-                </a:solidFill>
-              </a:rPr>
-              <a:t>ResourceQuota</a:t>
-            </a:r>
-            <a:endParaRPr lang="pl-PL" dirty="0" smtClean="0">
+              <a:rPr lang="pl-PL" dirty="0">
+                <a:solidFill>
+                  <a:schemeClr val="accent4">
+                    <a:lumMod val="50000"/>
+                  </a:schemeClr>
+                </a:solidFill>
+              </a:rPr>
+              <a:t>: Pod</a:t>
+            </a:r>
+          </a:p>
+          <a:p>
+            <a:r>
+              <a:rPr lang="pl-PL" dirty="0" err="1">
+                <a:solidFill>
+                  <a:schemeClr val="accent4">
+                    <a:lumMod val="50000"/>
+                  </a:schemeClr>
+                </a:solidFill>
+              </a:rPr>
+              <a:t>metadata</a:t>
+            </a:r>
+            <a:r>
+              <a:rPr lang="pl-PL" dirty="0">
+                <a:solidFill>
+                  <a:schemeClr val="accent4">
+                    <a:lumMod val="50000"/>
+                  </a:schemeClr>
+                </a:solidFill>
+              </a:rPr>
+              <a:t>:</a:t>
+            </a:r>
+          </a:p>
+          <a:p>
+            <a:r>
+              <a:rPr lang="pl-PL" dirty="0">
+                <a:solidFill>
+                  <a:schemeClr val="accent4">
+                    <a:lumMod val="50000"/>
+                  </a:schemeClr>
+                </a:solidFill>
+              </a:rPr>
+              <a:t>  </a:t>
+            </a:r>
+            <a:r>
+              <a:rPr lang="pl-PL" dirty="0" err="1">
+                <a:solidFill>
+                  <a:schemeClr val="accent4">
+                    <a:lumMod val="50000"/>
+                  </a:schemeClr>
+                </a:solidFill>
+              </a:rPr>
+              <a:t>name</a:t>
+            </a:r>
+            <a:r>
+              <a:rPr lang="pl-PL" dirty="0">
+                <a:solidFill>
+                  <a:schemeClr val="accent4">
+                    <a:lumMod val="50000"/>
+                  </a:schemeClr>
+                </a:solidFill>
+              </a:rPr>
+              <a:t>: pod-quota-2</a:t>
+            </a:r>
+          </a:p>
+          <a:p>
+            <a:r>
+              <a:rPr lang="pl-PL" dirty="0">
+                <a:solidFill>
+                  <a:schemeClr val="accent4">
+                    <a:lumMod val="50000"/>
+                  </a:schemeClr>
+                </a:solidFill>
+              </a:rPr>
+              <a:t>spec:</a:t>
+            </a:r>
+          </a:p>
+          <a:p>
+            <a:r>
+              <a:rPr lang="pl-PL" dirty="0">
+                <a:solidFill>
+                  <a:schemeClr val="accent4">
+                    <a:lumMod val="50000"/>
+                  </a:schemeClr>
+                </a:solidFill>
+              </a:rPr>
+              <a:t>  </a:t>
+            </a:r>
+            <a:r>
+              <a:rPr lang="pl-PL" dirty="0" err="1">
+                <a:solidFill>
+                  <a:schemeClr val="accent4">
+                    <a:lumMod val="50000"/>
+                  </a:schemeClr>
+                </a:solidFill>
+              </a:rPr>
+              <a:t>containers</a:t>
+            </a:r>
+            <a:r>
+              <a:rPr lang="pl-PL" dirty="0">
+                <a:solidFill>
+                  <a:schemeClr val="accent4">
+                    <a:lumMod val="50000"/>
+                  </a:schemeClr>
+                </a:solidFill>
+              </a:rPr>
+              <a:t>:</a:t>
+            </a:r>
+          </a:p>
+          <a:p>
+            <a:r>
+              <a:rPr lang="pl-PL" dirty="0">
+                <a:solidFill>
+                  <a:schemeClr val="accent4">
+                    <a:lumMod val="50000"/>
+                  </a:schemeClr>
+                </a:solidFill>
+              </a:rPr>
+              <a:t>  - </a:t>
+            </a:r>
+            <a:r>
+              <a:rPr lang="pl-PL" dirty="0" err="1">
+                <a:solidFill>
+                  <a:schemeClr val="accent4">
+                    <a:lumMod val="50000"/>
+                  </a:schemeClr>
+                </a:solidFill>
+              </a:rPr>
+              <a:t>name</a:t>
+            </a:r>
+            <a:r>
+              <a:rPr lang="pl-PL" dirty="0">
+                <a:solidFill>
+                  <a:schemeClr val="accent4">
+                    <a:lumMod val="50000"/>
+                  </a:schemeClr>
+                </a:solidFill>
+              </a:rPr>
+              <a:t>: pod-quota-2</a:t>
+            </a:r>
+          </a:p>
+          <a:p>
+            <a:r>
+              <a:rPr lang="pl-PL" dirty="0">
+                <a:solidFill>
+                  <a:schemeClr val="accent4">
+                    <a:lumMod val="50000"/>
+                  </a:schemeClr>
+                </a:solidFill>
+              </a:rPr>
+              <a:t>    image: </a:t>
+            </a:r>
+            <a:r>
+              <a:rPr lang="pl-PL" dirty="0" err="1">
+                <a:solidFill>
+                  <a:schemeClr val="accent4">
+                    <a:lumMod val="50000"/>
+                  </a:schemeClr>
+                </a:solidFill>
+              </a:rPr>
+              <a:t>redis</a:t>
+            </a:r>
+            <a:endParaRPr lang="pl-PL" dirty="0">
               <a:solidFill>
-                <a:srgbClr val="FF0000"/>
+                <a:schemeClr val="accent4">
+                  <a:lumMod val="50000"/>
+                </a:schemeClr>
               </a:solidFill>
             </a:endParaRPr>
           </a:p>
           <a:p>
-            <a:pPr marL="0" indent="0">
-              <a:buNone/>
-            </a:pPr>
-            <a:r>
-              <a:rPr lang="pl-PL" dirty="0" err="1" smtClean="0">
-                <a:solidFill>
-                  <a:schemeClr val="tx2"/>
-                </a:solidFill>
-              </a:rPr>
-              <a:t>metadata</a:t>
-            </a:r>
-            <a:r>
-              <a:rPr lang="pl-PL" dirty="0" smtClean="0">
-                <a:solidFill>
-                  <a:schemeClr val="tx2"/>
+            <a:r>
+              <a:rPr lang="pl-PL" b="1" dirty="0">
+                <a:solidFill>
+                  <a:schemeClr val="accent4">
+                    <a:lumMod val="50000"/>
+                  </a:schemeClr>
+                </a:solidFill>
+              </a:rPr>
+              <a:t>    </a:t>
+            </a:r>
+            <a:r>
+              <a:rPr lang="pl-PL" b="1" dirty="0" err="1">
+                <a:solidFill>
+                  <a:schemeClr val="accent4">
+                    <a:lumMod val="50000"/>
+                  </a:schemeClr>
+                </a:solidFill>
+              </a:rPr>
+              <a:t>resources</a:t>
+            </a:r>
+            <a:r>
+              <a:rPr lang="pl-PL" b="1" dirty="0">
+                <a:solidFill>
+                  <a:schemeClr val="accent4">
+                    <a:lumMod val="50000"/>
+                  </a:schemeClr>
                 </a:solidFill>
               </a:rPr>
               <a:t>:</a:t>
             </a:r>
           </a:p>
           <a:p>
-            <a:pPr marL="0" indent="0">
-              <a:buNone/>
-            </a:pPr>
-            <a:r>
-              <a:rPr lang="pl-PL" dirty="0" smtClean="0">
-                <a:solidFill>
-                  <a:schemeClr val="tx2"/>
-                </a:solidFill>
-              </a:rPr>
-              <a:t>  </a:t>
-            </a:r>
-            <a:r>
-              <a:rPr lang="pl-PL" dirty="0" err="1" smtClean="0">
-                <a:solidFill>
-                  <a:schemeClr val="tx2"/>
-                </a:solidFill>
-              </a:rPr>
-              <a:t>name</a:t>
-            </a:r>
-            <a:r>
-              <a:rPr lang="pl-PL" dirty="0" smtClean="0">
-                <a:solidFill>
-                  <a:schemeClr val="tx2"/>
-                </a:solidFill>
-              </a:rPr>
-              <a:t>: </a:t>
-            </a:r>
-            <a:r>
-              <a:rPr lang="pl-PL" dirty="0" err="1" smtClean="0">
-                <a:solidFill>
-                  <a:schemeClr val="tx2"/>
-                </a:solidFill>
-              </a:rPr>
-              <a:t>compute-resources</a:t>
-            </a:r>
-            <a:endParaRPr lang="pl-PL" dirty="0" smtClean="0">
-              <a:solidFill>
-                <a:schemeClr val="tx2"/>
-              </a:solidFill>
-            </a:endParaRPr>
-          </a:p>
-          <a:p>
-            <a:pPr marL="0" indent="0">
-              <a:buNone/>
-            </a:pPr>
-            <a:r>
-              <a:rPr lang="pl-PL" dirty="0" smtClean="0">
-                <a:solidFill>
-                  <a:schemeClr val="tx2"/>
-                </a:solidFill>
-              </a:rPr>
-              <a:t>spec:</a:t>
-            </a:r>
-          </a:p>
-          <a:p>
-            <a:pPr marL="0" indent="0">
-              <a:buNone/>
-            </a:pPr>
-            <a:r>
-              <a:rPr lang="pl-PL" dirty="0" smtClean="0">
-                <a:solidFill>
-                  <a:schemeClr val="tx2"/>
-                </a:solidFill>
-              </a:rPr>
-              <a:t>  hard:</a:t>
-            </a:r>
-          </a:p>
-          <a:p>
-            <a:pPr marL="0" indent="0">
-              <a:buNone/>
-            </a:pPr>
-            <a:r>
-              <a:rPr lang="pl-PL" dirty="0" smtClean="0">
-                <a:solidFill>
-                  <a:schemeClr val="tx2"/>
-                </a:solidFill>
-              </a:rPr>
-              <a:t>    </a:t>
-            </a:r>
-            <a:r>
-              <a:rPr lang="pl-PL" dirty="0" err="1" smtClean="0">
-                <a:solidFill>
-                  <a:schemeClr val="tx2"/>
-                </a:solidFill>
-              </a:rPr>
-              <a:t>pods</a:t>
-            </a:r>
-            <a:r>
-              <a:rPr lang="pl-PL" dirty="0" smtClean="0">
-                <a:solidFill>
-                  <a:schemeClr val="tx2"/>
-                </a:solidFill>
-              </a:rPr>
-              <a:t>: "20"</a:t>
-            </a:r>
-          </a:p>
-          <a:p>
-            <a:pPr marL="0" indent="0">
-              <a:buNone/>
-            </a:pPr>
-            <a:r>
-              <a:rPr lang="pl-PL" dirty="0" smtClean="0">
-                <a:solidFill>
-                  <a:schemeClr val="tx2"/>
-                </a:solidFill>
-              </a:rPr>
-              <a:t>    </a:t>
-            </a:r>
-            <a:r>
-              <a:rPr lang="pl-PL" dirty="0" err="1" smtClean="0">
-                <a:solidFill>
-                  <a:schemeClr val="tx2"/>
-                </a:solidFill>
-              </a:rPr>
-              <a:t>requests.cpu</a:t>
-            </a:r>
-            <a:r>
-              <a:rPr lang="pl-PL" dirty="0" smtClean="0">
-                <a:solidFill>
-                  <a:schemeClr val="tx2"/>
-                </a:solidFill>
-              </a:rPr>
-              <a:t>: "1"</a:t>
-            </a:r>
-          </a:p>
-          <a:p>
-            <a:pPr marL="0" indent="0">
-              <a:buNone/>
-            </a:pPr>
-            <a:r>
-              <a:rPr lang="pl-PL" dirty="0" smtClean="0">
-                <a:solidFill>
-                  <a:schemeClr val="tx2"/>
-                </a:solidFill>
-              </a:rPr>
-              <a:t>    </a:t>
-            </a:r>
-            <a:r>
-              <a:rPr lang="pl-PL" dirty="0" err="1" smtClean="0">
-                <a:solidFill>
-                  <a:schemeClr val="tx2"/>
-                </a:solidFill>
-              </a:rPr>
-              <a:t>requests.memory</a:t>
-            </a:r>
-            <a:r>
-              <a:rPr lang="pl-PL" dirty="0" smtClean="0">
-                <a:solidFill>
-                  <a:schemeClr val="tx2"/>
-                </a:solidFill>
-              </a:rPr>
-              <a:t>: 1Gi</a:t>
-            </a:r>
-          </a:p>
-          <a:p>
-            <a:pPr marL="0" indent="0">
-              <a:buNone/>
-            </a:pPr>
-            <a:r>
-              <a:rPr lang="pl-PL" dirty="0" smtClean="0">
-                <a:solidFill>
-                  <a:schemeClr val="tx2"/>
-                </a:solidFill>
-              </a:rPr>
-              <a:t>    </a:t>
-            </a:r>
-            <a:r>
-              <a:rPr lang="pl-PL" dirty="0" err="1" smtClean="0">
-                <a:solidFill>
-                  <a:schemeClr val="tx2"/>
-                </a:solidFill>
-              </a:rPr>
-              <a:t>limits.cpu</a:t>
-            </a:r>
-            <a:r>
-              <a:rPr lang="pl-PL" dirty="0" smtClean="0">
-                <a:solidFill>
-                  <a:schemeClr val="tx2"/>
-                </a:solidFill>
-              </a:rPr>
-              <a:t>: "2"</a:t>
-            </a:r>
-          </a:p>
-          <a:p>
-            <a:pPr marL="0" indent="0">
-              <a:buNone/>
-            </a:pPr>
-            <a:r>
-              <a:rPr lang="pl-PL" dirty="0" smtClean="0">
-                <a:solidFill>
-                  <a:schemeClr val="tx2"/>
-                </a:solidFill>
-              </a:rPr>
-              <a:t>    </a:t>
-            </a:r>
-            <a:r>
-              <a:rPr lang="pl-PL" dirty="0" err="1" smtClean="0">
-                <a:solidFill>
-                  <a:schemeClr val="tx2"/>
-                </a:solidFill>
-              </a:rPr>
-              <a:t>limits.memory</a:t>
-            </a:r>
-            <a:r>
-              <a:rPr lang="pl-PL" dirty="0" smtClean="0">
-                <a:solidFill>
-                  <a:schemeClr val="tx2"/>
-                </a:solidFill>
-              </a:rPr>
-              <a:t>: 2Gi</a:t>
-            </a:r>
-          </a:p>
-          <a:p>
-            <a:pPr marL="0" indent="0">
-              <a:buNone/>
-            </a:pPr>
-            <a:r>
-              <a:rPr lang="pl-PL" dirty="0" smtClean="0">
-                <a:solidFill>
-                  <a:schemeClr val="tx2"/>
-                </a:solidFill>
-              </a:rPr>
-              <a:t>    requests.nvidia.com/</a:t>
-            </a:r>
-            <a:r>
-              <a:rPr lang="pl-PL" dirty="0" err="1" smtClean="0">
-                <a:solidFill>
-                  <a:schemeClr val="tx2"/>
-                </a:solidFill>
-              </a:rPr>
-              <a:t>gpu</a:t>
-            </a:r>
-            <a:r>
-              <a:rPr lang="pl-PL" dirty="0" smtClean="0">
-                <a:solidFill>
-                  <a:schemeClr val="tx2"/>
-                </a:solidFill>
-              </a:rPr>
-              <a:t>: 3</a:t>
-            </a:r>
-            <a:endParaRPr lang="pl-PL" dirty="0" smtClean="0">
-              <a:solidFill>
-                <a:schemeClr val="tx2"/>
-              </a:solidFill>
-              <a:hlinkClick r:id="rId2"/>
-            </a:endParaRPr>
-          </a:p>
-          <a:p>
-            <a:endParaRPr lang="pl-PL" dirty="0"/>
+            <a:r>
+              <a:rPr lang="pl-PL" b="1" dirty="0">
+                <a:solidFill>
+                  <a:schemeClr val="accent4">
+                    <a:lumMod val="50000"/>
+                  </a:schemeClr>
+                </a:solidFill>
+              </a:rPr>
+              <a:t>      </a:t>
+            </a:r>
+            <a:r>
+              <a:rPr lang="pl-PL" b="1" dirty="0" err="1">
+                <a:solidFill>
+                  <a:schemeClr val="accent4">
+                    <a:lumMod val="50000"/>
+                  </a:schemeClr>
+                </a:solidFill>
+              </a:rPr>
+              <a:t>limits</a:t>
+            </a:r>
+            <a:r>
+              <a:rPr lang="pl-PL" b="1" dirty="0">
+                <a:solidFill>
+                  <a:schemeClr val="accent4">
+                    <a:lumMod val="50000"/>
+                  </a:schemeClr>
+                </a:solidFill>
+              </a:rPr>
+              <a:t>:</a:t>
+            </a:r>
+          </a:p>
+          <a:p>
+            <a:r>
+              <a:rPr lang="pl-PL" b="1" dirty="0">
+                <a:solidFill>
+                  <a:schemeClr val="accent4">
+                    <a:lumMod val="50000"/>
+                  </a:schemeClr>
+                </a:solidFill>
+              </a:rPr>
+              <a:t>        </a:t>
+            </a:r>
+            <a:r>
+              <a:rPr lang="pl-PL" b="1" dirty="0" err="1">
+                <a:solidFill>
+                  <a:schemeClr val="accent4">
+                    <a:lumMod val="50000"/>
+                  </a:schemeClr>
+                </a:solidFill>
+              </a:rPr>
+              <a:t>memory</a:t>
+            </a:r>
+            <a:r>
+              <a:rPr lang="pl-PL" b="1" dirty="0">
+                <a:solidFill>
+                  <a:schemeClr val="accent4">
+                    <a:lumMod val="50000"/>
+                  </a:schemeClr>
+                </a:solidFill>
+              </a:rPr>
+              <a:t>: "1Gi"</a:t>
+            </a:r>
+          </a:p>
+          <a:p>
+            <a:r>
+              <a:rPr lang="pl-PL" b="1" dirty="0">
+                <a:solidFill>
+                  <a:schemeClr val="accent4">
+                    <a:lumMod val="50000"/>
+                  </a:schemeClr>
+                </a:solidFill>
+              </a:rPr>
+              <a:t>        </a:t>
+            </a:r>
+            <a:r>
+              <a:rPr lang="pl-PL" b="1" dirty="0" err="1">
+                <a:solidFill>
+                  <a:schemeClr val="accent4">
+                    <a:lumMod val="50000"/>
+                  </a:schemeClr>
+                </a:solidFill>
+              </a:rPr>
+              <a:t>cpu</a:t>
+            </a:r>
+            <a:r>
+              <a:rPr lang="pl-PL" b="1" dirty="0">
+                <a:solidFill>
+                  <a:schemeClr val="accent4">
+                    <a:lumMod val="50000"/>
+                  </a:schemeClr>
+                </a:solidFill>
+              </a:rPr>
+              <a:t>: "800m"      </a:t>
+            </a:r>
+          </a:p>
+          <a:p>
+            <a:r>
+              <a:rPr lang="pl-PL" b="1" dirty="0">
+                <a:solidFill>
+                  <a:schemeClr val="accent4">
+                    <a:lumMod val="50000"/>
+                  </a:schemeClr>
+                </a:solidFill>
+              </a:rPr>
+              <a:t>      </a:t>
+            </a:r>
+            <a:r>
+              <a:rPr lang="pl-PL" b="1" dirty="0" err="1">
+                <a:solidFill>
+                  <a:schemeClr val="accent4">
+                    <a:lumMod val="50000"/>
+                  </a:schemeClr>
+                </a:solidFill>
+              </a:rPr>
+              <a:t>requests</a:t>
+            </a:r>
+            <a:r>
+              <a:rPr lang="pl-PL" b="1" dirty="0">
+                <a:solidFill>
+                  <a:schemeClr val="accent4">
+                    <a:lumMod val="50000"/>
+                  </a:schemeClr>
+                </a:solidFill>
+              </a:rPr>
+              <a:t>:</a:t>
+            </a:r>
+          </a:p>
+          <a:p>
+            <a:r>
+              <a:rPr lang="pl-PL" b="1" dirty="0">
+                <a:solidFill>
+                  <a:schemeClr val="accent4">
+                    <a:lumMod val="50000"/>
+                  </a:schemeClr>
+                </a:solidFill>
+              </a:rPr>
+              <a:t>        </a:t>
+            </a:r>
+            <a:r>
+              <a:rPr lang="pl-PL" b="1" dirty="0" err="1">
+                <a:solidFill>
+                  <a:schemeClr val="accent4">
+                    <a:lumMod val="50000"/>
+                  </a:schemeClr>
+                </a:solidFill>
+              </a:rPr>
+              <a:t>memory</a:t>
+            </a:r>
+            <a:r>
+              <a:rPr lang="pl-PL" b="1" dirty="0">
+                <a:solidFill>
+                  <a:schemeClr val="accent4">
+                    <a:lumMod val="50000"/>
+                  </a:schemeClr>
+                </a:solidFill>
+              </a:rPr>
+              <a:t>: "700Mi"</a:t>
+            </a:r>
+          </a:p>
+          <a:p>
+            <a:r>
+              <a:rPr lang="pl-PL" b="1" dirty="0">
+                <a:solidFill>
+                  <a:schemeClr val="accent4">
+                    <a:lumMod val="50000"/>
+                  </a:schemeClr>
+                </a:solidFill>
+              </a:rPr>
+              <a:t>        </a:t>
+            </a:r>
+            <a:r>
+              <a:rPr lang="pl-PL" b="1" dirty="0" err="1">
+                <a:solidFill>
+                  <a:schemeClr val="accent4">
+                    <a:lumMod val="50000"/>
+                  </a:schemeClr>
+                </a:solidFill>
+              </a:rPr>
+              <a:t>cpu</a:t>
+            </a:r>
+            <a:r>
+              <a:rPr lang="pl-PL" b="1" dirty="0">
+                <a:solidFill>
+                  <a:schemeClr val="accent4">
+                    <a:lumMod val="50000"/>
+                  </a:schemeClr>
+                </a:solidFill>
+              </a:rPr>
+              <a:t>: "400m"</a:t>
+            </a:r>
+          </a:p>
+          <a:p>
+            <a:r>
+              <a:rPr lang="pl-PL" dirty="0"/>
+              <a:t> </a:t>
+            </a:r>
           </a:p>
         </p:txBody>
       </p:sp>
     </p:spTree>
     <p:extLst>
       <p:ext uri="{BB962C8B-B14F-4D97-AF65-F5344CB8AC3E}">
-        <p14:creationId xmlns:p14="http://schemas.microsoft.com/office/powerpoint/2010/main" val="4111604730"/>
+        <p14:creationId xmlns:p14="http://schemas.microsoft.com/office/powerpoint/2010/main" val="3781876501"/>
       </p:ext>
     </p:extLst>
   </p:cSld>
@@ -4447,12 +4745,8 @@
           <a:lstStyle/>
           <a:p>
             <a:r>
-              <a:rPr lang="pl-PL" dirty="0" smtClean="0"/>
-              <a:t>Limit </a:t>
-            </a:r>
-            <a:r>
               <a:rPr lang="pl-PL" dirty="0" err="1" smtClean="0"/>
-              <a:t>range</a:t>
+              <a:t>Namespaces</a:t>
             </a:r>
             <a:endParaRPr lang="pl-PL" dirty="0"/>
           </a:p>
@@ -4468,344 +4762,66 @@
             <p:ph idx="1"/>
           </p:nvPr>
         </p:nvSpPr>
-        <p:spPr>
-          <a:xfrm>
-            <a:off x="502920" y="530352"/>
-            <a:ext cx="8183880" cy="5130896"/>
-          </a:xfrm>
-        </p:spPr>
+        <p:spPr/>
         <p:txBody>
           <a:bodyPr>
-            <a:normAutofit fontScale="62500" lnSpcReduction="20000"/>
+            <a:normAutofit fontScale="92500" lnSpcReduction="10000"/>
           </a:bodyPr>
           <a:lstStyle/>
           <a:p>
-            <a:pPr marL="0" indent="0">
-              <a:buNone/>
-            </a:pPr>
-            <a:r>
-              <a:rPr lang="pl-PL" dirty="0" err="1"/>
-              <a:t>apiVersion</a:t>
-            </a:r>
-            <a:r>
-              <a:rPr lang="pl-PL" dirty="0"/>
-              <a:t>: v1</a:t>
-            </a:r>
-          </a:p>
-          <a:p>
-            <a:pPr marL="0" indent="0">
-              <a:buNone/>
-            </a:pPr>
-            <a:r>
-              <a:rPr lang="pl-PL" dirty="0" err="1"/>
-              <a:t>kind</a:t>
-            </a:r>
-            <a:r>
-              <a:rPr lang="pl-PL" dirty="0"/>
-              <a:t>: </a:t>
-            </a:r>
-            <a:r>
-              <a:rPr lang="pl-PL" dirty="0" err="1"/>
-              <a:t>LimitRange</a:t>
-            </a:r>
-            <a:endParaRPr lang="pl-PL" dirty="0"/>
-          </a:p>
-          <a:p>
-            <a:pPr marL="0" indent="0">
-              <a:buNone/>
-            </a:pPr>
-            <a:r>
-              <a:rPr lang="pl-PL" dirty="0" err="1"/>
-              <a:t>metadata</a:t>
-            </a:r>
-            <a:r>
-              <a:rPr lang="pl-PL" dirty="0"/>
-              <a:t>:</a:t>
-            </a:r>
-          </a:p>
-          <a:p>
-            <a:pPr marL="0" indent="0">
-              <a:buNone/>
-            </a:pPr>
-            <a:r>
-              <a:rPr lang="pl-PL" dirty="0"/>
-              <a:t>  </a:t>
-            </a:r>
-            <a:r>
-              <a:rPr lang="pl-PL" dirty="0" err="1"/>
-              <a:t>name</a:t>
-            </a:r>
-            <a:r>
-              <a:rPr lang="pl-PL" dirty="0"/>
-              <a:t>: limit-</a:t>
-            </a:r>
-            <a:r>
-              <a:rPr lang="pl-PL" dirty="0" err="1"/>
-              <a:t>mem</a:t>
-            </a:r>
-            <a:r>
-              <a:rPr lang="pl-PL" dirty="0"/>
-              <a:t>-</a:t>
-            </a:r>
-            <a:r>
-              <a:rPr lang="pl-PL" dirty="0" err="1"/>
-              <a:t>cpu</a:t>
-            </a:r>
-            <a:r>
-              <a:rPr lang="pl-PL" dirty="0"/>
-              <a:t>-per-</a:t>
-            </a:r>
-            <a:r>
-              <a:rPr lang="pl-PL" dirty="0" err="1"/>
-              <a:t>container</a:t>
-            </a:r>
-            <a:endParaRPr lang="pl-PL" dirty="0"/>
-          </a:p>
-          <a:p>
-            <a:pPr marL="0" indent="0">
-              <a:buNone/>
-            </a:pPr>
-            <a:r>
-              <a:rPr lang="pl-PL" dirty="0"/>
-              <a:t>spec:</a:t>
-            </a:r>
-          </a:p>
-          <a:p>
-            <a:pPr marL="0" indent="0">
-              <a:buNone/>
-            </a:pPr>
-            <a:r>
-              <a:rPr lang="pl-PL" dirty="0"/>
-              <a:t>  </a:t>
-            </a:r>
-            <a:r>
-              <a:rPr lang="pl-PL" dirty="0" err="1"/>
-              <a:t>limits</a:t>
-            </a:r>
-            <a:r>
-              <a:rPr lang="pl-PL" dirty="0"/>
-              <a:t>:</a:t>
-            </a:r>
-          </a:p>
-          <a:p>
-            <a:pPr marL="0" indent="0">
-              <a:buNone/>
-            </a:pPr>
-            <a:r>
-              <a:rPr lang="pl-PL" dirty="0"/>
-              <a:t>  - max:</a:t>
-            </a:r>
-          </a:p>
-          <a:p>
-            <a:pPr marL="0" indent="0">
-              <a:buNone/>
-            </a:pPr>
-            <a:r>
-              <a:rPr lang="pl-PL" dirty="0"/>
-              <a:t>      </a:t>
-            </a:r>
-            <a:r>
-              <a:rPr lang="pl-PL" dirty="0" err="1"/>
-              <a:t>cpu</a:t>
-            </a:r>
-            <a:r>
-              <a:rPr lang="pl-PL" dirty="0"/>
-              <a:t>: "800m"</a:t>
-            </a:r>
-          </a:p>
-          <a:p>
-            <a:pPr marL="0" indent="0">
-              <a:buNone/>
-            </a:pPr>
-            <a:r>
-              <a:rPr lang="pl-PL" dirty="0"/>
-              <a:t>      </a:t>
-            </a:r>
-            <a:r>
-              <a:rPr lang="pl-PL" dirty="0" err="1"/>
-              <a:t>memory</a:t>
-            </a:r>
-            <a:r>
-              <a:rPr lang="pl-PL" dirty="0"/>
-              <a:t>: "1Gi"</a:t>
-            </a:r>
-          </a:p>
-          <a:p>
-            <a:pPr marL="0" indent="0">
-              <a:buNone/>
-            </a:pPr>
-            <a:r>
-              <a:rPr lang="pl-PL" dirty="0"/>
-              <a:t>    min:</a:t>
-            </a:r>
-          </a:p>
-          <a:p>
-            <a:pPr marL="0" indent="0">
-              <a:buNone/>
-            </a:pPr>
-            <a:r>
-              <a:rPr lang="pl-PL" dirty="0"/>
-              <a:t>      </a:t>
-            </a:r>
-            <a:r>
-              <a:rPr lang="pl-PL" dirty="0" err="1"/>
-              <a:t>cpu</a:t>
-            </a:r>
-            <a:r>
-              <a:rPr lang="pl-PL" dirty="0"/>
-              <a:t>: "50m"</a:t>
-            </a:r>
-          </a:p>
-          <a:p>
-            <a:pPr marL="0" indent="0">
-              <a:buNone/>
-            </a:pPr>
-            <a:r>
-              <a:rPr lang="pl-PL" dirty="0"/>
-              <a:t>      </a:t>
-            </a:r>
-            <a:r>
-              <a:rPr lang="pl-PL" dirty="0" err="1"/>
-              <a:t>memory</a:t>
-            </a:r>
-            <a:r>
-              <a:rPr lang="pl-PL" dirty="0"/>
-              <a:t>: "50Mi"</a:t>
-            </a:r>
-          </a:p>
-          <a:p>
-            <a:pPr marL="0" indent="0">
-              <a:buNone/>
-            </a:pPr>
-            <a:r>
-              <a:rPr lang="pl-PL" dirty="0"/>
-              <a:t>    </a:t>
-            </a:r>
-            <a:r>
-              <a:rPr lang="pl-PL" dirty="0" err="1"/>
-              <a:t>default</a:t>
-            </a:r>
-            <a:r>
-              <a:rPr lang="pl-PL" dirty="0"/>
-              <a:t>:</a:t>
-            </a:r>
-          </a:p>
-          <a:p>
-            <a:pPr marL="0" indent="0">
-              <a:buNone/>
-            </a:pPr>
-            <a:r>
-              <a:rPr lang="pl-PL" dirty="0"/>
-              <a:t>      </a:t>
-            </a:r>
-            <a:r>
-              <a:rPr lang="pl-PL" dirty="0" err="1"/>
-              <a:t>cpu</a:t>
-            </a:r>
-            <a:r>
-              <a:rPr lang="pl-PL" dirty="0"/>
-              <a:t>: "200m"</a:t>
-            </a:r>
-          </a:p>
-          <a:p>
-            <a:pPr marL="0" indent="0">
-              <a:buNone/>
-            </a:pPr>
-            <a:r>
-              <a:rPr lang="pl-PL" dirty="0"/>
-              <a:t>      </a:t>
-            </a:r>
-            <a:r>
-              <a:rPr lang="pl-PL" dirty="0" err="1"/>
-              <a:t>memory</a:t>
-            </a:r>
-            <a:r>
-              <a:rPr lang="pl-PL" dirty="0"/>
-              <a:t>: "200Mi"</a:t>
-            </a:r>
-          </a:p>
-          <a:p>
-            <a:pPr marL="0" indent="0">
-              <a:buNone/>
-            </a:pPr>
-            <a:r>
-              <a:rPr lang="pl-PL" dirty="0"/>
-              <a:t>    </a:t>
-            </a:r>
-            <a:r>
-              <a:rPr lang="pl-PL" dirty="0" err="1"/>
-              <a:t>defaultRequest</a:t>
-            </a:r>
-            <a:r>
-              <a:rPr lang="pl-PL" dirty="0"/>
-              <a:t>:</a:t>
-            </a:r>
-          </a:p>
-          <a:p>
-            <a:pPr marL="0" indent="0">
-              <a:buNone/>
-            </a:pPr>
-            <a:r>
-              <a:rPr lang="pl-PL" dirty="0"/>
-              <a:t>      </a:t>
-            </a:r>
-            <a:r>
-              <a:rPr lang="pl-PL" dirty="0" err="1"/>
-              <a:t>cpu</a:t>
-            </a:r>
-            <a:r>
-              <a:rPr lang="pl-PL" dirty="0"/>
-              <a:t>: "100m"</a:t>
-            </a:r>
-          </a:p>
-          <a:p>
-            <a:pPr marL="0" indent="0">
-              <a:buNone/>
-            </a:pPr>
-            <a:r>
-              <a:rPr lang="pl-PL" dirty="0"/>
-              <a:t>      </a:t>
-            </a:r>
-            <a:r>
-              <a:rPr lang="pl-PL" dirty="0" err="1"/>
-              <a:t>memory</a:t>
-            </a:r>
-            <a:r>
-              <a:rPr lang="pl-PL" dirty="0"/>
-              <a:t>: "100Mi"</a:t>
-            </a:r>
-          </a:p>
-          <a:p>
-            <a:pPr marL="0" indent="0">
-              <a:buNone/>
-            </a:pPr>
-            <a:r>
-              <a:rPr lang="pl-PL" dirty="0"/>
-              <a:t>    </a:t>
-            </a:r>
-            <a:r>
-              <a:rPr lang="pl-PL" dirty="0" err="1">
+            <a:r>
+              <a:rPr lang="en-US" dirty="0"/>
+              <a:t>Beyond the individual container resources, you may want to investigate setting limits on namespaces. So what is a namespace? Namespaces can be used to define a cluster of applications, departments, or environments. Simply, Namespace refers to scope or grouping of objects in a Kubernetes </a:t>
+            </a:r>
+            <a:r>
+              <a:rPr lang="en-US" dirty="0" smtClean="0"/>
+              <a:t>cluster</a:t>
+            </a:r>
+            <a:endParaRPr lang="pl-PL" dirty="0" smtClean="0"/>
+          </a:p>
+          <a:p>
+            <a:endParaRPr lang="pl-PL" dirty="0" smtClean="0"/>
+          </a:p>
+          <a:p>
+            <a:r>
+              <a:rPr lang="en-US" dirty="0">
                 <a:solidFill>
                   <a:srgbClr val="FF0000"/>
                 </a:solidFill>
               </a:rPr>
-              <a:t>type</a:t>
-            </a:r>
-            <a:r>
-              <a:rPr lang="pl-PL" dirty="0">
+              <a:t>At the Namespace level, you can set up </a:t>
+            </a:r>
+            <a:r>
+              <a:rPr lang="en-US" dirty="0" err="1">
                 <a:solidFill>
                   <a:srgbClr val="FF0000"/>
                 </a:solidFill>
               </a:rPr>
-              <a:t>: </a:t>
-            </a:r>
-            <a:r>
-              <a:rPr lang="pl-PL" dirty="0" err="1">
+              <a:t>ResourceQuotas</a:t>
+            </a:r>
+            <a:r>
+              <a:rPr lang="en-US" dirty="0">
                 <a:solidFill>
                   <a:srgbClr val="FF0000"/>
                 </a:solidFill>
               </a:rPr>
-              <a:t>Container</a:t>
+              <a:t> and </a:t>
+            </a:r>
+            <a:r>
+              <a:rPr lang="en-US" dirty="0" err="1">
+                <a:solidFill>
+                  <a:srgbClr val="FF0000"/>
+                </a:solidFill>
+              </a:rPr>
+              <a:t>LimitRanges</a:t>
+            </a:r>
+            <a:r>
+              <a:rPr lang="en-US" dirty="0">
+                <a:solidFill>
+                  <a:srgbClr val="FF0000"/>
+                </a:solidFill>
+              </a:rPr>
+              <a:t>.</a:t>
             </a:r>
             <a:endParaRPr lang="pl-PL" dirty="0">
               <a:solidFill>
@@ -4818,13 +4834,20 @@
     </p:spTree>
     <p:extLst>
       <p:ext uri="{BB962C8B-B14F-4D97-AF65-F5344CB8AC3E}">
-        <p14:creationId xmlns:p14="http://schemas.microsoft.com/office/powerpoint/2010/main" val="1770858312"/>
+        <p14:creationId xmlns:p14="http://schemas.microsoft.com/office/powerpoint/2010/main" val="194794197"/>
       </p:ext>
     </p:extLst>
   </p:cSld>
   <p:clrMapOvr>
     <a:masterClrMapping/>
   </p:clrMapOvr>
+  <p:timing>
+    <p:tnLst>
+      <p:par>
+        <p:cTn id="1" dur="indefinite" restart="never" nodeType="tmRoot"/>
+      </p:par>
+    </p:tnLst>
+  </p:timing>
 </p:sld>
 </file>
 
@@ -4861,32 +4884,51 @@
           <a:lstStyle/>
           <a:p>
             <a:r>
-              <a:rPr lang="pl-PL" dirty="0" err="1" smtClean="0"/>
-              <a:t>Resources</a:t>
-            </a:r>
-            <a:r>
               <a:rPr lang="pl-PL" dirty="0" smtClean="0"/>
-              <a:t> </a:t>
+              <a:t>Resource </a:t>
             </a:r>
             <a:r>
               <a:rPr lang="pl-PL" dirty="0" err="1" smtClean="0"/>
               <a:t>quota</a:t>
             </a:r>
-            <a:r>
-              <a:rPr lang="pl-PL" dirty="0" smtClean="0"/>
-              <a:t>/limit </a:t>
-            </a:r>
-            <a:r>
-              <a:rPr lang="pl-PL" dirty="0" err="1" smtClean="0"/>
-              <a:t>range</a:t>
-            </a:r>
             <a:endParaRPr lang="pl-PL" dirty="0"/>
           </a:p>
         </p:txBody>
       </p:sp>
       <p:sp>
         <p:nvSpPr>
-          <p:cNvPr id="3" name="Symbol zastępczy zawartości 2"/>
+          <p:cNvPr id="4" name="Prostokąt 3"/>
+          <p:cNvSpPr/>
+          <p:nvPr/>
+        </p:nvSpPr>
+        <p:spPr>
+          <a:xfrm>
+            <a:off x="755576" y="4725144"/>
+            <a:ext cx="6912768" cy="646331"/>
+          </a:xfrm>
+          <a:prstGeom prst="rect">
+            <a:avLst/>
+          </a:prstGeom>
+        </p:spPr>
+        <p:txBody>
+          <a:bodyPr wrap="square">
+            <a:spAutoFit/>
+          </a:bodyPr>
+          <a:lstStyle/>
+          <a:p>
+            <a:r>
+              <a:rPr lang="pl-PL" dirty="0">
+                <a:hlinkClick r:id="rId2"/>
+              </a:rPr>
+              <a:t>https://github.com/djkormo/k8s-AKS-primer/tree/master/examples/quotas</a:t>
+            </a:r>
+            <a:endParaRPr lang="pl-PL" dirty="0"/>
+          </a:p>
+        </p:txBody>
+      </p:sp>
+      <p:sp>
+        <p:nvSpPr>
+          <p:cNvPr id="5" name="Symbol zastępczy zawartości 4"/>
           <p:cNvSpPr>
             <a:spLocks noGrp="1"/>
           </p:cNvSpPr>
@@ -4896,36 +4938,343 @@
         </p:nvSpPr>
         <p:spPr/>
         <p:txBody>
-          <a:bodyPr/>
+          <a:bodyPr>
+            <a:normAutofit fontScale="85000" lnSpcReduction="20000"/>
+          </a:bodyPr>
           <a:lstStyle/>
           <a:p>
-            <a:endParaRPr lang="pl-PL" dirty="0" smtClean="0"/>
+            <a:pPr marL="0" indent="0">
+              <a:buNone/>
+            </a:pPr>
+            <a:r>
+              <a:rPr lang="pl-PL" dirty="0" err="1" smtClean="0">
+                <a:solidFill>
+                  <a:srgbClr val="FF0000"/>
+                </a:solidFill>
+              </a:rPr>
+              <a:t>apiVersion</a:t>
+            </a:r>
+            <a:r>
+              <a:rPr lang="pl-PL" dirty="0" smtClean="0">
+                <a:solidFill>
+                  <a:srgbClr val="FF0000"/>
+                </a:solidFill>
+              </a:rPr>
+              <a:t>: v1</a:t>
+            </a:r>
+          </a:p>
+          <a:p>
+            <a:pPr marL="0" indent="0">
+              <a:buNone/>
+            </a:pPr>
+            <a:r>
+              <a:rPr lang="pl-PL" dirty="0" err="1" smtClean="0">
+                <a:solidFill>
+                  <a:srgbClr val="FF0000"/>
+                </a:solidFill>
+              </a:rPr>
+              <a:t>kind</a:t>
+            </a:r>
+            <a:r>
+              <a:rPr lang="pl-PL" dirty="0" smtClean="0">
+                <a:solidFill>
+                  <a:srgbClr val="FF0000"/>
+                </a:solidFill>
+              </a:rPr>
+              <a:t>: </a:t>
+            </a:r>
+            <a:r>
+              <a:rPr lang="pl-PL" dirty="0" err="1" smtClean="0">
+                <a:solidFill>
+                  <a:srgbClr val="FF0000"/>
+                </a:solidFill>
+              </a:rPr>
+              <a:t>ResourceQuota</a:t>
+            </a:r>
+            <a:endParaRPr lang="pl-PL" dirty="0" smtClean="0">
+              <a:solidFill>
+                <a:srgbClr val="FF0000"/>
+              </a:solidFill>
+            </a:endParaRPr>
+          </a:p>
+          <a:p>
+            <a:pPr marL="0" indent="0">
+              <a:buNone/>
+            </a:pPr>
+            <a:r>
+              <a:rPr lang="pl-PL" dirty="0" err="1" smtClean="0">
+                <a:solidFill>
+                  <a:schemeClr val="tx2"/>
+                </a:solidFill>
+              </a:rPr>
+              <a:t>metadata</a:t>
+            </a:r>
+            <a:r>
+              <a:rPr lang="pl-PL" dirty="0" smtClean="0">
+                <a:solidFill>
+                  <a:schemeClr val="tx2"/>
+                </a:solidFill>
+              </a:rPr>
+              <a:t>:</a:t>
+            </a:r>
+          </a:p>
+          <a:p>
+            <a:pPr marL="0" indent="0">
+              <a:buNone/>
+            </a:pPr>
+            <a:r>
+              <a:rPr lang="pl-PL" dirty="0" smtClean="0">
+                <a:solidFill>
+                  <a:schemeClr val="tx2"/>
+                </a:solidFill>
+              </a:rPr>
+              <a:t>  </a:t>
+            </a:r>
+            <a:r>
+              <a:rPr lang="pl-PL" dirty="0" err="1" smtClean="0">
+                <a:solidFill>
+                  <a:schemeClr val="tx2"/>
+                </a:solidFill>
+              </a:rPr>
+              <a:t>name</a:t>
+            </a:r>
+            <a:r>
+              <a:rPr lang="pl-PL" dirty="0" smtClean="0">
+                <a:solidFill>
+                  <a:schemeClr val="tx2"/>
+                </a:solidFill>
+              </a:rPr>
+              <a:t>: </a:t>
+            </a:r>
+            <a:r>
+              <a:rPr lang="pl-PL" dirty="0" err="1" smtClean="0">
+                <a:solidFill>
+                  <a:schemeClr val="tx2"/>
+                </a:solidFill>
+              </a:rPr>
+              <a:t>compute-resources</a:t>
+            </a:r>
+            <a:endParaRPr lang="pl-PL" dirty="0" smtClean="0">
+              <a:solidFill>
+                <a:schemeClr val="tx2"/>
+              </a:solidFill>
+            </a:endParaRPr>
+          </a:p>
+          <a:p>
+            <a:pPr marL="0" indent="0">
+              <a:buNone/>
+            </a:pPr>
+            <a:r>
+              <a:rPr lang="pl-PL" dirty="0" smtClean="0">
+                <a:solidFill>
+                  <a:schemeClr val="tx2"/>
+                </a:solidFill>
+              </a:rPr>
+              <a:t>spec:</a:t>
+            </a:r>
+          </a:p>
+          <a:p>
+            <a:pPr marL="0" indent="0">
+              <a:buNone/>
+            </a:pPr>
+            <a:r>
+              <a:rPr lang="pl-PL" dirty="0" smtClean="0">
+                <a:solidFill>
+                  <a:schemeClr val="tx2"/>
+                </a:solidFill>
+              </a:rPr>
+              <a:t>  hard:</a:t>
+            </a:r>
+          </a:p>
+          <a:p>
+            <a:pPr marL="0" indent="0">
+              <a:buNone/>
+            </a:pPr>
+            <a:r>
+              <a:rPr lang="pl-PL" dirty="0" smtClean="0">
+                <a:solidFill>
+                  <a:schemeClr val="tx2"/>
+                </a:solidFill>
+              </a:rPr>
+              <a:t>    </a:t>
+            </a:r>
+            <a:r>
+              <a:rPr lang="pl-PL" dirty="0" err="1" smtClean="0">
+                <a:solidFill>
+                  <a:schemeClr val="tx2"/>
+                </a:solidFill>
+              </a:rPr>
+              <a:t>pods</a:t>
+            </a:r>
+            <a:r>
+              <a:rPr lang="pl-PL" dirty="0" smtClean="0">
+                <a:solidFill>
+                  <a:schemeClr val="tx2"/>
+                </a:solidFill>
+              </a:rPr>
+              <a:t>: "20"</a:t>
+            </a:r>
+          </a:p>
+          <a:p>
+            <a:pPr marL="0" indent="0">
+              <a:buNone/>
+            </a:pPr>
+            <a:r>
+              <a:rPr lang="pl-PL" dirty="0" smtClean="0">
+                <a:solidFill>
+                  <a:schemeClr val="tx2"/>
+                </a:solidFill>
+              </a:rPr>
+              <a:t>    </a:t>
+            </a:r>
+            <a:r>
+              <a:rPr lang="pl-PL" dirty="0" err="1" smtClean="0">
+                <a:solidFill>
+                  <a:schemeClr val="tx2"/>
+                </a:solidFill>
+              </a:rPr>
+              <a:t>requests.cpu</a:t>
+            </a:r>
+            <a:r>
+              <a:rPr lang="pl-PL" dirty="0" smtClean="0">
+                <a:solidFill>
+                  <a:schemeClr val="tx2"/>
+                </a:solidFill>
+              </a:rPr>
+              <a:t>: "1"</a:t>
+            </a:r>
+          </a:p>
+          <a:p>
+            <a:pPr marL="0" indent="0">
+              <a:buNone/>
+            </a:pPr>
+            <a:r>
+              <a:rPr lang="pl-PL" dirty="0" smtClean="0">
+                <a:solidFill>
+                  <a:schemeClr val="tx2"/>
+                </a:solidFill>
+              </a:rPr>
+              <a:t>    </a:t>
+            </a:r>
+            <a:r>
+              <a:rPr lang="pl-PL" dirty="0" err="1" smtClean="0">
+                <a:solidFill>
+                  <a:schemeClr val="tx2"/>
+                </a:solidFill>
+              </a:rPr>
+              <a:t>requests.memory</a:t>
+            </a:r>
+            <a:r>
+              <a:rPr lang="pl-PL" dirty="0" smtClean="0">
+                <a:solidFill>
+                  <a:schemeClr val="tx2"/>
+                </a:solidFill>
+              </a:rPr>
+              <a:t>: 1Gi</a:t>
+            </a:r>
+          </a:p>
+          <a:p>
+            <a:pPr marL="0" indent="0">
+              <a:buNone/>
+            </a:pPr>
+            <a:r>
+              <a:rPr lang="pl-PL" dirty="0" smtClean="0">
+                <a:solidFill>
+                  <a:schemeClr val="tx2"/>
+                </a:solidFill>
+              </a:rPr>
+              <a:t>    </a:t>
+            </a:r>
+            <a:r>
+              <a:rPr lang="pl-PL" dirty="0" err="1" smtClean="0">
+                <a:solidFill>
+                  <a:schemeClr val="tx2"/>
+                </a:solidFill>
+              </a:rPr>
+              <a:t>limits.cpu</a:t>
+            </a:r>
+            <a:r>
+              <a:rPr lang="pl-PL" dirty="0" smtClean="0">
+                <a:solidFill>
+                  <a:schemeClr val="tx2"/>
+                </a:solidFill>
+              </a:rPr>
+              <a:t>: "2"</a:t>
+            </a:r>
+          </a:p>
+          <a:p>
+            <a:pPr marL="0" indent="0">
+              <a:buNone/>
+            </a:pPr>
+            <a:r>
+              <a:rPr lang="pl-PL" dirty="0" smtClean="0">
+                <a:solidFill>
+                  <a:schemeClr val="tx2"/>
+                </a:solidFill>
+              </a:rPr>
+              <a:t>    </a:t>
+            </a:r>
+            <a:r>
+              <a:rPr lang="pl-PL" dirty="0" err="1" smtClean="0">
+                <a:solidFill>
+                  <a:schemeClr val="tx2"/>
+                </a:solidFill>
+              </a:rPr>
+              <a:t>limits.memory</a:t>
+            </a:r>
+            <a:r>
+              <a:rPr lang="pl-PL" dirty="0" smtClean="0">
+                <a:solidFill>
+                  <a:schemeClr val="tx2"/>
+                </a:solidFill>
+              </a:rPr>
+              <a:t>: 2Gi</a:t>
+            </a:r>
+          </a:p>
+          <a:p>
+            <a:pPr marL="0" indent="0">
+              <a:buNone/>
+            </a:pPr>
+            <a:r>
+              <a:rPr lang="pl-PL" dirty="0" smtClean="0">
+                <a:solidFill>
+                  <a:schemeClr val="tx2"/>
+                </a:solidFill>
+              </a:rPr>
+              <a:t>    requests.nvidia.com/</a:t>
+            </a:r>
+            <a:r>
+              <a:rPr lang="pl-PL" dirty="0" err="1" smtClean="0">
+                <a:solidFill>
+                  <a:schemeClr val="tx2"/>
+                </a:solidFill>
+              </a:rPr>
+              <a:t>gpu</a:t>
+            </a:r>
+            <a:r>
+              <a:rPr lang="pl-PL" dirty="0" smtClean="0">
+                <a:solidFill>
+                  <a:schemeClr val="tx2"/>
+                </a:solidFill>
+              </a:rPr>
+              <a:t>: 3</a:t>
+            </a:r>
+            <a:endParaRPr lang="pl-PL" dirty="0" smtClean="0">
+              <a:solidFill>
+                <a:schemeClr val="tx2"/>
+              </a:solidFill>
+              <a:hlinkClick r:id="rId2"/>
+            </a:endParaRPr>
           </a:p>
           <a:p>
             <a:endParaRPr lang="pl-PL" dirty="0"/>
-          </a:p>
-          <a:p>
-            <a:endParaRPr lang="pl-PL" dirty="0" smtClean="0"/>
-          </a:p>
-          <a:p>
-            <a:endParaRPr lang="pl-PL" dirty="0"/>
-          </a:p>
-          <a:p>
-            <a:pPr marL="0" indent="0" algn="ctr">
-              <a:buNone/>
-            </a:pPr>
-            <a:r>
-              <a:rPr lang="pl-PL" sz="4000" dirty="0" smtClean="0"/>
-              <a:t>DEMO</a:t>
-            </a:r>
-            <a:endParaRPr lang="pl-PL" sz="4000" dirty="0"/>
           </a:p>
         </p:txBody>
       </p:sp>
     </p:spTree>
     <p:extLst>
       <p:ext uri="{BB962C8B-B14F-4D97-AF65-F5344CB8AC3E}">
-        <p14:creationId xmlns:p14="http://schemas.microsoft.com/office/powerpoint/2010/main" val="2502144188"/>
+        <p14:creationId xmlns:p14="http://schemas.microsoft.com/office/powerpoint/2010/main" val="4111604730"/>
       </p:ext>
     </p:extLst>
   </p:cSld>
@@ -4976,11 +5325,11 @@
           <a:p>
             <a:r>
               <a:rPr lang="pl-PL" dirty="0" smtClean="0"/>
-              <a:t>Resource </a:t>
+              <a:t>Limit </a:t>
             </a:r>
             <a:r>
               <a:rPr lang="pl-PL" dirty="0" err="1" smtClean="0"/>
-              <a:t>quotas</a:t>
+              <a:t>range</a:t>
             </a:r>
             <a:endParaRPr lang="pl-PL" dirty="0"/>
           </a:p>
@@ -4988,7 +5337,7 @@
       </p:sp>
       <p:sp>
         <p:nvSpPr>
-          <p:cNvPr id="5" name="Symbol zastępczy zawartości 4"/>
+          <p:cNvPr id="3" name="Symbol zastępczy zawartości 2"/>
           <p:cNvSpPr>
             <a:spLocks noGrp="1"/>
           </p:cNvSpPr>
@@ -4996,10 +5345,15 @@
             <p:ph idx="1"/>
           </p:nvPr>
         </p:nvSpPr>
-        <p:spPr/>
+        <p:spPr>
+          <a:xfrm>
+            <a:off x="502920" y="530352"/>
+            <a:ext cx="8183880" cy="5130896"/>
+          </a:xfrm>
+        </p:spPr>
         <p:txBody>
           <a:bodyPr>
-            <a:normAutofit fontScale="85000" lnSpcReduction="20000"/>
+            <a:normAutofit fontScale="62500" lnSpcReduction="20000"/>
           </a:bodyPr>
           <a:lstStyle/>
           <a:p>
@@ -5029,7 +5383,7 @@
             </a:r>
             <a:r>
               <a:rPr lang="pl-PL" dirty="0" err="1"/>
-              <a:t>ResourceQuota</a:t>
+              <a:t>LimitRange</a:t>
             </a:r>
             <a:endParaRPr lang="pl-PL" dirty="0"/>
           </a:p>
@@ -5060,11 +5414,27 @@
             </a:r>
             <a:r>
               <a:rPr lang="pl-PL" dirty="0"/>
-              <a:t>: </a:t>
+              <a:t>: limit-</a:t>
             </a:r>
             <a:r>
               <a:rPr lang="pl-PL" dirty="0" err="1"/>
-              <a:t>compute-resources</a:t>
+              <a:t>mem</a:t>
+            </a:r>
+            <a:r>
+              <a:rPr lang="pl-PL" dirty="0"/>
+              <a:t>-</a:t>
+            </a:r>
+            <a:r>
+              <a:rPr lang="pl-PL" dirty="0" err="1"/>
+              <a:t>cpu</a:t>
+            </a:r>
+            <a:r>
+              <a:rPr lang="pl-PL" dirty="0"/>
+              <a:t>-per-</a:t>
+            </a:r>
+            <a:r>
+              <a:rPr lang="pl-PL" dirty="0" err="1"/>
+              <a:t>container</a:t>
             </a:r>
             <a:endParaRPr lang="pl-PL" dirty="0"/>
           </a:p>
@@ -5083,7 +5453,101 @@
             </a:pPr>
             <a:r>
               <a:rPr lang="pl-PL" dirty="0"/>
-              <a:t>  hard:</a:t>
+              <a:t>  </a:t>
+            </a:r>
+            <a:r>
+              <a:rPr lang="pl-PL" dirty="0" err="1"/>
+              <a:t>limits</a:t>
+            </a:r>
+            <a:r>
+              <a:rPr lang="pl-PL" dirty="0"/>
+              <a:t>:</a:t>
+            </a:r>
+          </a:p>
+          <a:p>
+            <a:pPr marL="0" indent="0">
+              <a:buNone/>
+            </a:pPr>
+            <a:r>
+              <a:rPr lang="pl-PL" dirty="0"/>
+              <a:t>  - max:</a:t>
+            </a:r>
+          </a:p>
+          <a:p>
+            <a:pPr marL="0" indent="0">
+              <a:buNone/>
+            </a:pPr>
+            <a:r>
+              <a:rPr lang="pl-PL" dirty="0"/>
+              <a:t>      </a:t>
+            </a:r>
+            <a:r>
+              <a:rPr lang="pl-PL" dirty="0" err="1"/>
+              <a:t>cpu</a:t>
+            </a:r>
+            <a:r>
+              <a:rPr lang="pl-PL" dirty="0"/>
+              <a:t>: "800m"</a:t>
+            </a:r>
+          </a:p>
+          <a:p>
+            <a:pPr marL="0" indent="0">
+              <a:buNone/>
+            </a:pPr>
+            <a:r>
+              <a:rPr lang="pl-PL" dirty="0"/>
+              <a:t>      </a:t>
+            </a:r>
+            <a:r>
+              <a:rPr lang="pl-PL" dirty="0" err="1"/>
+              <a:t>memory</a:t>
+            </a:r>
+            <a:r>
+              <a:rPr lang="pl-PL" dirty="0"/>
+              <a:t>: "1Gi"</a:t>
+            </a:r>
+          </a:p>
+          <a:p>
+            <a:pPr marL="0" indent="0">
+              <a:buNone/>
+            </a:pPr>
+            <a:r>
+              <a:rPr lang="pl-PL" dirty="0"/>
+              <a:t>    min:</a:t>
+            </a:r>
+          </a:p>
+          <a:p>
+            <a:pPr marL="0" indent="0">
+              <a:buNone/>
+            </a:pPr>
+            <a:r>
+              <a:rPr lang="pl-PL" dirty="0"/>
+              <a:t>      </a:t>
+            </a:r>
+            <a:r>
+              <a:rPr lang="pl-PL" dirty="0" err="1"/>
+              <a:t>cpu</a:t>
+            </a:r>
+            <a:r>
+              <a:rPr lang="pl-PL" dirty="0"/>
+              <a:t>: "50m"</a:t>
+            </a:r>
+          </a:p>
+          <a:p>
+            <a:pPr marL="0" indent="0">
+              <a:buNone/>
+            </a:pPr>
+            <a:r>
+              <a:rPr lang="pl-PL" dirty="0"/>
+              <a:t>      </a:t>
+            </a:r>
+            <a:r>
+              <a:rPr lang="pl-PL" dirty="0" err="1"/>
+              <a:t>memory</a:t>
+            </a:r>
+            <a:r>
+              <a:rPr lang="pl-PL" dirty="0"/>
+              <a:t>: "50Mi"</a:t>
             </a:r>
           </a:p>
           <a:p>
@@ -5096,11 +5560,45 @@
             </a:r>
             <a:r>
               <a:rPr lang="pl-PL" dirty="0" err="1"/>
-              <a:t>pods</a:t>
+              <a:t>default</a:t>
             </a:r>
             <a:r>
               <a:rPr lang="pl-PL" dirty="0"/>
-              <a:t>: "20"</a:t>
+              <a:t>:</a:t>
+            </a:r>
+          </a:p>
+          <a:p>
+            <a:pPr marL="0" indent="0">
+              <a:buNone/>
+            </a:pPr>
+            <a:r>
+              <a:rPr lang="pl-PL" dirty="0"/>
+              <a:t>      </a:t>
+            </a:r>
+            <a:r>
+              <a:rPr lang="pl-PL" dirty="0" err="1"/>
+              <a:t>cpu</a:t>
+            </a:r>
+            <a:r>
+              <a:rPr lang="pl-PL" dirty="0"/>
+              <a:t>: "200m"</a:t>
+            </a:r>
+          </a:p>
+          <a:p>
+            <a:pPr marL="0" indent="0">
+              <a:buNone/>
+            </a:pPr>
+            <a:r>
+              <a:rPr lang="pl-PL" dirty="0"/>
+              <a:t>      </a:t>
+            </a:r>
+            <a:r>
+              <a:rPr lang="pl-PL" dirty="0" err="1"/>
+              <a:t>memory</a:t>
+            </a:r>
+            <a:r>
+              <a:rPr lang="pl-PL" dirty="0"/>
+              <a:t>: "200Mi"</a:t>
             </a:r>
           </a:p>
           <a:p>
@@ -5113,11 +5611,45 @@
             </a:r>
             <a:r>
               <a:rPr lang="pl-PL" dirty="0" err="1"/>
-              <a:t>requests.cpu</a:t>
+              <a:t>defaultRequest</a:t>
             </a:r>
             <a:r>
               <a:rPr lang="pl-PL" dirty="0"/>
-              <a:t>: "1"</a:t>
+              <a:t>:</a:t>
+            </a:r>
+          </a:p>
+          <a:p>
+            <a:pPr marL="0" indent="0">
+              <a:buNone/>
+            </a:pPr>
+            <a:r>
+              <a:rPr lang="pl-PL" dirty="0"/>
+              <a:t>      </a:t>
+            </a:r>
+            <a:r>
+              <a:rPr lang="pl-PL" dirty="0" err="1"/>
+              <a:t>cpu</a:t>
+            </a:r>
+            <a:r>
+              <a:rPr lang="pl-PL" dirty="0"/>
+              <a:t>: "100m"</a:t>
+            </a:r>
+          </a:p>
+          <a:p>
+            <a:pPr marL="0" indent="0">
+              <a:buNone/>
+            </a:pPr>
+            <a:r>
+              <a:rPr lang="pl-PL" dirty="0"/>
+              <a:t>      </a:t>
+            </a:r>
+            <a:r>
+              <a:rPr lang="pl-PL" dirty="0" err="1"/>
+              <a:t>memory</a:t>
+            </a:r>
+            <a:r>
+              <a:rPr lang="pl-PL" dirty="0"/>
+              <a:t>: "100Mi"</a:t>
             </a:r>
           </a:p>
           <a:p>
@@ -5129,84 +5661,47 @@
               <a:t>    </a:t>
             </a:r>
             <a:r>
-              <a:rPr lang="pl-PL" dirty="0" err="1"/>
-              <a:t>requests.memory</a:t>
-            </a:r>
-            <a:r>
-              <a:rPr lang="pl-PL" dirty="0"/>
-              <a:t>: 1Gi</a:t>
-            </a:r>
-          </a:p>
-          <a:p>
-            <a:pPr marL="0" indent="0">
-              <a:buNone/>
-            </a:pPr>
-            <a:r>
-              <a:rPr lang="pl-PL" dirty="0"/>
-              <a:t>    </a:t>
-            </a:r>
-            <a:r>
-              <a:rPr lang="pl-PL" dirty="0" err="1"/>
-              <a:t>limits.cpu</a:t>
-            </a:r>
-            <a:r>
-              <a:rPr lang="pl-PL" dirty="0"/>
-              <a:t>: "2"</a:t>
-            </a:r>
-          </a:p>
-          <a:p>
-            <a:pPr marL="0" indent="0">
-              <a:buNone/>
-            </a:pPr>
-            <a:r>
-              <a:rPr lang="pl-PL" dirty="0"/>
-              <a:t>    </a:t>
-            </a:r>
-            <a:r>
-              <a:rPr lang="pl-PL" dirty="0" err="1"/>
-              <a:t>limits.memory</a:t>
-            </a:r>
-            <a:r>
-              <a:rPr lang="pl-PL" dirty="0"/>
-              <a:t>: 2Gi</a:t>
-            </a:r>
-          </a:p>
-          <a:p>
-            <a:pPr marL="0" indent="0">
-              <a:buNone/>
-            </a:pPr>
-            <a:r>
-              <a:rPr lang="pl-PL" dirty="0"/>
-              <a:t>    requests.nvidia.com/</a:t>
-            </a:r>
-            <a:r>
-              <a:rPr lang="pl-PL" dirty="0" err="1"/>
-              <a:t>gpu</a:t>
-            </a:r>
-            <a:r>
-              <a:rPr lang="pl-PL" dirty="0"/>
-              <a:t>: 3</a:t>
-            </a:r>
+              <a:rPr lang="pl-PL" dirty="0" err="1">
+                <a:solidFill>
+                  <a:srgbClr val="FF0000"/>
+                </a:solidFill>
+              </a:rPr>
+              <a:t>type</a:t>
+            </a:r>
+            <a:r>
+              <a:rPr lang="pl-PL" dirty="0">
+                <a:solidFill>
+                  <a:srgbClr val="FF0000"/>
+                </a:solidFill>
+              </a:rPr>
+              <a:t>: </a:t>
+            </a:r>
+            <a:r>
+              <a:rPr lang="pl-PL" dirty="0" err="1">
+                <a:solidFill>
+                  <a:srgbClr val="FF0000"/>
+                </a:solidFill>
+              </a:rPr>
+              <a:t>Container</a:t>
+            </a:r>
+            <a:endParaRPr lang="pl-PL" dirty="0">
+              <a:solidFill>
+                <a:srgbClr val="FF0000"/>
+              </a:solidFill>
+            </a:endParaRPr>
           </a:p>
         </p:txBody>
       </p:sp>
     </p:spTree>
     <p:extLst>
       <p:ext uri="{BB962C8B-B14F-4D97-AF65-F5344CB8AC3E}">
-        <p14:creationId xmlns:p14="http://schemas.microsoft.com/office/powerpoint/2010/main" val="3495179704"/>
+        <p14:creationId xmlns:p14="http://schemas.microsoft.com/office/powerpoint/2010/main" val="1770858312"/>
       </p:ext>
     </p:extLst>
   </p:cSld>
   <p:clrMapOvr>
     <a:masterClrMapping/>
   </p:clrMapOvr>
-  <p:timing>
-    <p:tnLst>
-      <p:par>
-        <p:cTn id="1" dur="indefinite" restart="never" nodeType="tmRoot"/>
-      </p:par>
-    </p:tnLst>
-  </p:timing>
 </p:sld>
 </file>
 
@@ -5243,8 +5738,24 @@
           <a:lstStyle/>
           <a:p>
             <a:r>
+              <a:rPr lang="pl-PL" dirty="0" err="1" smtClean="0"/>
+              <a:t>Resources</a:t>
+            </a:r>
+            <a:r>
               <a:rPr lang="pl-PL" dirty="0" smtClean="0"/>
-              <a:t>CPU</a:t>
+              <a:t> </a:t>
+            </a:r>
+            <a:r>
+              <a:rPr lang="pl-PL" dirty="0" err="1" smtClean="0"/>
+              <a:t>quota</a:t>
+            </a:r>
+            <a:r>
+              <a:rPr lang="pl-PL" dirty="0" smtClean="0"/>
+              <a:t>/limit </a:t>
+            </a:r>
+            <a:r>
+              <a:rPr lang="pl-PL" dirty="0" err="1" smtClean="0"/>
+              <a:t>range</a:t>
             </a:r>
             <a:endParaRPr lang="pl-PL" dirty="0"/>
           </a:p>
@@ -5262,61 +5773,49 @@
         </p:nvSpPr>
         <p:spPr/>
         <p:txBody>
-          <a:bodyPr>
-            <a:normAutofit fontScale="92500"/>
-          </a:bodyPr>
+          <a:bodyPr/>
           <a:lstStyle/>
           <a:p>
-            <a:r>
-              <a:rPr lang="en-US" dirty="0"/>
-              <a:t>CPU resources are measured in </a:t>
-            </a:r>
-            <a:r>
-              <a:rPr lang="en-US" dirty="0" err="1"/>
-              <a:t>millicore</a:t>
-            </a:r>
-            <a:r>
-              <a:rPr lang="en-US" dirty="0"/>
-              <a:t>. If a node has 2 cores, the node’s CPU capacity would be represented as 2000m. The unit suffix m stands for “thousandth of a core.”</a:t>
-            </a:r>
-          </a:p>
-          <a:p>
-            <a:r>
-              <a:rPr lang="en-US" dirty="0"/>
-              <a:t>1000m or 1000 </a:t>
-            </a:r>
-            <a:r>
-              <a:rPr lang="en-US" dirty="0" err="1"/>
-              <a:t>millicore</a:t>
-            </a:r>
-            <a:r>
-              <a:rPr lang="en-US" dirty="0"/>
-              <a:t> is equal to 1 core. 4000m would represent 4 cores. 250 </a:t>
-            </a:r>
-            <a:r>
-              <a:rPr lang="en-US" dirty="0" err="1"/>
-              <a:t>millicore</a:t>
-            </a:r>
-            <a:r>
-              <a:rPr lang="en-US" dirty="0"/>
-              <a:t> per pod means 4 pods with a similar value of 250m can run on a single core. On a 4 core node, 16 pods each having 250m can run on that node.</a:t>
-            </a:r>
+            <a:endParaRPr lang="pl-PL" dirty="0" smtClean="0"/>
           </a:p>
           <a:p>
             <a:endParaRPr lang="pl-PL" dirty="0"/>
+          </a:p>
+          <a:p>
+            <a:endParaRPr lang="pl-PL" dirty="0" smtClean="0"/>
+          </a:p>
+          <a:p>
+            <a:endParaRPr lang="pl-PL" dirty="0"/>
+          </a:p>
+          <a:p>
+            <a:pPr marL="0" indent="0" algn="ctr">
+              <a:buNone/>
+            </a:pPr>
+            <a:r>
+              <a:rPr lang="pl-PL" sz="4000" dirty="0" smtClean="0"/>
+              <a:t>DEMO</a:t>
+            </a:r>
+            <a:endParaRPr lang="pl-PL" sz="4000" dirty="0"/>
           </a:p>
         </p:txBody>
       </p:sp>
     </p:spTree>
     <p:extLst>
       <p:ext uri="{BB962C8B-B14F-4D97-AF65-F5344CB8AC3E}">
-        <p14:creationId xmlns:p14="http://schemas.microsoft.com/office/powerpoint/2010/main" val="147757337"/>
+        <p14:creationId xmlns:p14="http://schemas.microsoft.com/office/powerpoint/2010/main" val="2502144188"/>
       </p:ext>
     </p:extLst>
   </p:cSld>
   <p:clrMapOvr>
     <a:masterClrMapping/>
   </p:clrMapOvr>
+  <p:timing>
+    <p:tnLst>
+      <p:par>
+        <p:cTn id="1" dur="indefinite" restart="never" nodeType="tmRoot"/>
+      </p:par>
+    </p:tnLst>
+  </p:timing>
 </p:sld>
 </file>
 
@@ -5354,7 +5853,11 @@
           <a:p>
             <a:r>
               <a:rPr lang="pl-PL" dirty="0" smtClean="0"/>
-              <a:t>Memory</a:t>
+              <a:t>Resource </a:t>
+            </a:r>
+            <a:r>
+              <a:rPr lang="pl-PL" dirty="0" err="1" smtClean="0"/>
+              <a:t>quotas</a:t>
             </a:r>
             <a:endParaRPr lang="pl-PL" dirty="0"/>
           </a:p>
@@ -5362,7 +5865,7 @@
       </p:sp>
       <p:sp>
         <p:nvSpPr>
-          <p:cNvPr id="3" name="Symbol zastępczy zawartości 2"/>
+          <p:cNvPr id="5" name="Symbol zastępczy zawartości 4"/>
           <p:cNvSpPr>
             <a:spLocks noGrp="1"/>
           </p:cNvSpPr>
@@ -5373,104 +5876,214 @@
         <p:spPr/>
         <p:txBody>
           <a:bodyPr>
-            <a:normAutofit fontScale="92500" lnSpcReduction="20000"/>
+            <a:normAutofit fontScale="85000" lnSpcReduction="20000"/>
           </a:bodyPr>
           <a:lstStyle/>
           <a:p>
-            <a:r>
-              <a:rPr lang="en-US" dirty="0"/>
-              <a:t>Memory is measured in bytes. However, you can express memory with various suffixes (E,P,T,G,M,K and </a:t>
-            </a:r>
-            <a:r>
-              <a:rPr lang="en-US" dirty="0" err="1"/>
-              <a:t>Ei</a:t>
-            </a:r>
-            <a:r>
-              <a:rPr lang="en-US" dirty="0"/>
-              <a:t>, Pi, </a:t>
-            </a:r>
-            <a:r>
-              <a:rPr lang="en-US" dirty="0" err="1"/>
-              <a:t>Ti</a:t>
-            </a:r>
-            <a:r>
-              <a:rPr lang="en-US" dirty="0"/>
-              <a:t>, </a:t>
-            </a:r>
-            <a:r>
-              <a:rPr lang="en-US" dirty="0" err="1"/>
-              <a:t>Gi</a:t>
-            </a:r>
-            <a:r>
-              <a:rPr lang="en-US" dirty="0"/>
-              <a:t>, </a:t>
-            </a:r>
-            <a:r>
-              <a:rPr lang="en-US" dirty="0" err="1"/>
-              <a:t>Mi</a:t>
-            </a:r>
-            <a:r>
-              <a:rPr lang="en-US" dirty="0"/>
-              <a:t>, Ki) to express </a:t>
-            </a:r>
-            <a:r>
-              <a:rPr lang="en-US" dirty="0" err="1"/>
-              <a:t>mebibytes</a:t>
-            </a:r>
-            <a:r>
-              <a:rPr lang="en-US" dirty="0"/>
-              <a:t> (</a:t>
-            </a:r>
-            <a:r>
-              <a:rPr lang="en-US" dirty="0" err="1"/>
-              <a:t>Mi</a:t>
-            </a:r>
-            <a:r>
-              <a:rPr lang="en-US" dirty="0"/>
-              <a:t>) to petabytes (Pi). </a:t>
-            </a:r>
-            <a:r>
-              <a:rPr lang="en-US" b="1" dirty="0"/>
-              <a:t>Most simply use Mi</a:t>
-            </a:r>
-            <a:r>
-              <a:rPr lang="en-US" dirty="0"/>
-              <a:t>.</a:t>
-            </a:r>
-          </a:p>
-          <a:p>
-            <a:r>
-              <a:rPr lang="en-US" dirty="0"/>
-              <a:t>Like CPU, </a:t>
-            </a:r>
-            <a:r>
-              <a:rPr lang="en-US" dirty="0">
-                <a:solidFill>
-                  <a:srgbClr val="FF0000"/>
-                </a:solidFill>
-              </a:rPr>
-              <a:t>pods will never be scheduled if they require more resources than the capacity of a node</a:t>
-            </a:r>
-            <a:r>
-              <a:rPr lang="en-US" dirty="0"/>
-              <a:t>. Unlike CPU, memory is not compressible. You can’t make memory run slower or faster like CPU or network throttling. Pods will be terminated if it reaches the memory limit.</a:t>
-            </a:r>
-          </a:p>
-          <a:p>
+            <a:pPr marL="0" indent="0">
+              <a:buNone/>
+            </a:pPr>
+            <a:r>
+              <a:rPr lang="pl-PL" dirty="0" err="1"/>
+              <a:t>apiVersion</a:t>
+            </a:r>
+            <a:r>
+              <a:rPr lang="pl-PL" dirty="0"/>
+              <a:t>: v1</a:t>
+            </a:r>
+          </a:p>
+          <a:p>
+            <a:pPr marL="0" indent="0">
+              <a:buNone/>
+            </a:pPr>
+            <a:r>
+              <a:rPr lang="pl-PL" dirty="0" err="1"/>
+              <a:t>kind</a:t>
+            </a:r>
+            <a:r>
+              <a:rPr lang="pl-PL" dirty="0"/>
+              <a:t>: </a:t>
+            </a:r>
+            <a:r>
+              <a:rPr lang="pl-PL" dirty="0" err="1"/>
+              <a:t>ResourceQuota</a:t>
+            </a:r>
             <a:endParaRPr lang="pl-PL" dirty="0"/>
+          </a:p>
+          <a:p>
+            <a:pPr marL="0" indent="0">
+              <a:buNone/>
+            </a:pPr>
+            <a:r>
+              <a:rPr lang="pl-PL" dirty="0" err="1"/>
+              <a:t>metadata</a:t>
+            </a:r>
+            <a:r>
+              <a:rPr lang="pl-PL" dirty="0"/>
+              <a:t>:</a:t>
+            </a:r>
+          </a:p>
+          <a:p>
+            <a:pPr marL="0" indent="0">
+              <a:buNone/>
+            </a:pPr>
+            <a:r>
+              <a:rPr lang="pl-PL" dirty="0"/>
+              <a:t>  </a:t>
+            </a:r>
+            <a:r>
+              <a:rPr lang="pl-PL" dirty="0" err="1"/>
+              <a:t>name</a:t>
+            </a:r>
+            <a:r>
+              <a:rPr lang="pl-PL" dirty="0"/>
+              <a:t>: </a:t>
+            </a:r>
+            <a:r>
+              <a:rPr lang="pl-PL" dirty="0" err="1"/>
+              <a:t>compute-resources</a:t>
+            </a:r>
+            <a:endParaRPr lang="pl-PL" dirty="0"/>
+          </a:p>
+          <a:p>
+            <a:pPr marL="0" indent="0">
+              <a:buNone/>
+            </a:pPr>
+            <a:r>
+              <a:rPr lang="pl-PL" dirty="0"/>
+              <a:t>spec:</a:t>
+            </a:r>
+          </a:p>
+          <a:p>
+            <a:pPr marL="0" indent="0">
+              <a:buNone/>
+            </a:pPr>
+            <a:r>
+              <a:rPr lang="pl-PL" dirty="0"/>
+              <a:t>  hard:</a:t>
+            </a:r>
+          </a:p>
+          <a:p>
+            <a:pPr marL="0" indent="0">
+              <a:buNone/>
+            </a:pPr>
+            <a:r>
+              <a:rPr lang="pl-PL" dirty="0"/>
+              <a:t>    </a:t>
+            </a:r>
+            <a:r>
+              <a:rPr lang="pl-PL" dirty="0" err="1"/>
+              <a:t>pods</a:t>
+            </a:r>
+            <a:r>
+              <a:rPr lang="pl-PL" dirty="0"/>
+              <a:t>: "20"</a:t>
+            </a:r>
+          </a:p>
+          <a:p>
+            <a:pPr marL="0" indent="0">
+              <a:buNone/>
+            </a:pPr>
+            <a:r>
+              <a:rPr lang="pl-PL" dirty="0"/>
+              <a:t>    </a:t>
+            </a:r>
+            <a:r>
+              <a:rPr lang="pl-PL" dirty="0" err="1"/>
+              <a:t>requests.cpu</a:t>
+            </a:r>
+            <a:r>
+              <a:rPr lang="pl-PL" dirty="0"/>
+              <a:t>: "1"</a:t>
+            </a:r>
+          </a:p>
+          <a:p>
+            <a:pPr marL="0" indent="0">
+              <a:buNone/>
+            </a:pPr>
+            <a:r>
+              <a:rPr lang="pl-PL" dirty="0"/>
+              <a:t>    </a:t>
+            </a:r>
+            <a:r>
+              <a:rPr lang="pl-PL" dirty="0" err="1"/>
+              <a:t>requests.memory</a:t>
+            </a:r>
+            <a:r>
+              <a:rPr lang="pl-PL" dirty="0"/>
+              <a:t>: 1Gi</a:t>
+            </a:r>
+          </a:p>
+          <a:p>
+            <a:pPr marL="0" indent="0">
+              <a:buNone/>
+            </a:pPr>
+            <a:r>
+              <a:rPr lang="pl-PL" dirty="0"/>
+              <a:t>    </a:t>
+            </a:r>
+            <a:r>
+              <a:rPr lang="pl-PL" dirty="0" err="1"/>
+              <a:t>limits.cpu</a:t>
+            </a:r>
+            <a:r>
+              <a:rPr lang="pl-PL" dirty="0"/>
+              <a:t>: "2"</a:t>
+            </a:r>
+          </a:p>
+          <a:p>
+            <a:pPr marL="0" indent="0">
+              <a:buNone/>
+            </a:pPr>
+            <a:r>
+              <a:rPr lang="pl-PL" dirty="0"/>
+              <a:t>    </a:t>
+            </a:r>
+            <a:r>
+              <a:rPr lang="pl-PL" dirty="0" err="1"/>
+              <a:t>limits.memory</a:t>
+            </a:r>
+            <a:r>
+              <a:rPr lang="pl-PL" dirty="0"/>
+              <a:t>: 2Gi</a:t>
+            </a:r>
+          </a:p>
+          <a:p>
+            <a:pPr marL="0" indent="0">
+              <a:buNone/>
+            </a:pPr>
+            <a:r>
+              <a:rPr lang="pl-PL" dirty="0"/>
+              <a:t>    requests.nvidia.com/</a:t>
+            </a:r>
+            <a:r>
+              <a:rPr lang="pl-PL" dirty="0" err="1"/>
+              <a:t>gpu</a:t>
+            </a:r>
+            <a:r>
+              <a:rPr lang="pl-PL" dirty="0"/>
+              <a:t>: 3</a:t>
+            </a:r>
           </a:p>
         </p:txBody>
       </p:sp>
     </p:spTree>
     <p:extLst>
       <p:ext uri="{BB962C8B-B14F-4D97-AF65-F5344CB8AC3E}">
-        <p14:creationId xmlns:p14="http://schemas.microsoft.com/office/powerpoint/2010/main" val="3653138814"/>
+        <p14:creationId xmlns:p14="http://schemas.microsoft.com/office/powerpoint/2010/main" val="3495179704"/>
       </p:ext>
     </p:extLst>
   </p:cSld>
   <p:clrMapOvr>
     <a:masterClrMapping/>
   </p:clrMapOvr>
+  <p:timing>
+    <p:tnLst>
+      <p:par>
+        <p:cTn id="1" dur="indefinite" restart="never" nodeType="tmRoot"/>
+      </p:par>
+    </p:tnLst>
+  </p:timing>
 </p:sld>
 </file>
 
@@ -8814,6 +9427,270 @@
           <a:lstStyle/>
           <a:p>
             <a:r>
+              <a:rPr lang="pl-PL" dirty="0" smtClean="0"/>
+              <a:t>CPU</a:t>
+            </a:r>
+            <a:endParaRPr lang="pl-PL" dirty="0"/>
+          </a:p>
+        </p:txBody>
+      </p:sp>
+      <p:sp>
+        <p:nvSpPr>
+          <p:cNvPr id="3" name="Symbol zastępczy zawartości 2"/>
+          <p:cNvSpPr>
+            <a:spLocks noGrp="1"/>
+          </p:cNvSpPr>
+          <p:nvPr>
+            <p:ph idx="1"/>
+          </p:nvPr>
+        </p:nvSpPr>
+        <p:spPr/>
+        <p:txBody>
+          <a:bodyPr>
+            <a:normAutofit fontScale="92500"/>
+          </a:bodyPr>
+          <a:lstStyle/>
+          <a:p>
+            <a:r>
+              <a:rPr lang="en-US" dirty="0"/>
+              <a:t>CPU resources are measured in </a:t>
+            </a:r>
+            <a:r>
+              <a:rPr lang="en-US" dirty="0" err="1"/>
+              <a:t>millicore</a:t>
+            </a:r>
+            <a:r>
+              <a:rPr lang="en-US" dirty="0"/>
+              <a:t>. If a node has 2 cores, the node’s CPU capacity would be represented as 2000m. The unit suffix m stands for “thousandth of a core.”</a:t>
+            </a:r>
+          </a:p>
+          <a:p>
+            <a:r>
+              <a:rPr lang="en-US" dirty="0"/>
+              <a:t>1000m or 1000 </a:t>
+            </a:r>
+            <a:r>
+              <a:rPr lang="en-US" dirty="0" err="1"/>
+              <a:t>millicore</a:t>
+            </a:r>
+            <a:r>
+              <a:rPr lang="en-US" dirty="0"/>
+              <a:t> is equal to 1 core. 4000m would represent 4 cores. 250 </a:t>
+            </a:r>
+            <a:r>
+              <a:rPr lang="en-US" dirty="0" err="1"/>
+              <a:t>millicore</a:t>
+            </a:r>
+            <a:r>
+              <a:rPr lang="en-US" dirty="0"/>
+              <a:t> per pod means 4 pods with a similar value of 250m can run on a single core. On a 4 core node, 16 pods each having 250m can run on that node.</a:t>
+            </a:r>
+          </a:p>
+          <a:p>
+            <a:endParaRPr lang="pl-PL" dirty="0"/>
+          </a:p>
+        </p:txBody>
+      </p:sp>
+    </p:spTree>
+    <p:extLst>
+      <p:ext uri="{BB962C8B-B14F-4D97-AF65-F5344CB8AC3E}">
+        <p14:creationId xmlns:p14="http://schemas.microsoft.com/office/powerpoint/2010/main" val="147757337"/>
+      </p:ext>
+    </p:extLst>
+  </p:cSld>
+  <p:clrMapOvr>
+    <a:masterClrMapping/>
+  </p:clrMapOvr>
+</p:sld>
+</file>
+
+<file path=ppt/slides/slide8.xml><?xml version="1.0" encoding="utf-8"?>
+<p:sld xmlns:a="http://schemas.openxmlformats.org/drawingml/2006/main" xmlns:r="http://schemas.openxmlformats.org/officeDocument/2006/relationships" xmlns:p="http://schemas.openxmlformats.org/presentationml/2006/main">
+  <p:cSld>
+    <p:spTree>
+      <p:nvGrpSpPr>
+        <p:cNvPr id="1" name=""/>
+        <p:cNvGrpSpPr/>
+        <p:nvPr/>
+      </p:nvGrpSpPr>
+      <p:grpSpPr>
+        <a:xfrm>
+          <a:off x="0" y="0"/>
+          <a:ext cx="0" cy="0"/>
+          <a:chOff x="0" y="0"/>
+          <a:chExt cx="0" cy="0"/>
+        </a:xfrm>
+      </p:grpSpPr>
+      <p:sp>
+        <p:nvSpPr>
+          <p:cNvPr id="2" name="Tytuł 1"/>
+          <p:cNvSpPr>
+            <a:spLocks noGrp="1"/>
+          </p:cNvSpPr>
+          <p:nvPr>
+            <p:ph type="title"/>
+          </p:nvPr>
+        </p:nvSpPr>
+        <p:spPr/>
+        <p:txBody>
+          <a:bodyPr/>
+          <a:lstStyle/>
+          <a:p>
+            <a:r>
+              <a:rPr lang="pl-PL" dirty="0" smtClean="0"/>
+              <a:t>Memory</a:t>
+            </a:r>
+            <a:endParaRPr lang="pl-PL" dirty="0"/>
+          </a:p>
+        </p:txBody>
+      </p:sp>
+      <p:sp>
+        <p:nvSpPr>
+          <p:cNvPr id="3" name="Symbol zastępczy zawartości 2"/>
+          <p:cNvSpPr>
+            <a:spLocks noGrp="1"/>
+          </p:cNvSpPr>
+          <p:nvPr>
+            <p:ph idx="1"/>
+          </p:nvPr>
+        </p:nvSpPr>
+        <p:spPr/>
+        <p:txBody>
+          <a:bodyPr>
+            <a:normAutofit fontScale="92500" lnSpcReduction="20000"/>
+          </a:bodyPr>
+          <a:lstStyle/>
+          <a:p>
+            <a:r>
+              <a:rPr lang="en-US" dirty="0"/>
+              <a:t>Memory is measured in bytes. However, you can express memory with various suffixes (E,P,T,G,M,K and </a:t>
+            </a:r>
+            <a:r>
+              <a:rPr lang="en-US" dirty="0" err="1"/>
+              <a:t>Ei</a:t>
+            </a:r>
+            <a:r>
+              <a:rPr lang="en-US" dirty="0"/>
+              <a:t>, Pi, </a:t>
+            </a:r>
+            <a:r>
+              <a:rPr lang="en-US" dirty="0" err="1"/>
+              <a:t>Ti</a:t>
+            </a:r>
+            <a:r>
+              <a:rPr lang="en-US" dirty="0"/>
+              <a:t>, </a:t>
+            </a:r>
+            <a:r>
+              <a:rPr lang="en-US" dirty="0" err="1"/>
+              <a:t>Gi</a:t>
+            </a:r>
+            <a:r>
+              <a:rPr lang="en-US" dirty="0"/>
+              <a:t>, </a:t>
+            </a:r>
+            <a:r>
+              <a:rPr lang="en-US" dirty="0" err="1"/>
+              <a:t>Mi</a:t>
+            </a:r>
+            <a:r>
+              <a:rPr lang="en-US" dirty="0"/>
+              <a:t>, Ki) to express </a:t>
+            </a:r>
+            <a:r>
+              <a:rPr lang="en-US" dirty="0" err="1"/>
+              <a:t>mebibytes</a:t>
+            </a:r>
+            <a:r>
+              <a:rPr lang="en-US" dirty="0"/>
+              <a:t> (</a:t>
+            </a:r>
+            <a:r>
+              <a:rPr lang="en-US" dirty="0" err="1"/>
+              <a:t>Mi</a:t>
+            </a:r>
+            <a:r>
+              <a:rPr lang="en-US" dirty="0"/>
+              <a:t>) to petabytes (Pi). </a:t>
+            </a:r>
+            <a:r>
+              <a:rPr lang="en-US" b="1" dirty="0"/>
+              <a:t>Most simply use Mi</a:t>
+            </a:r>
+            <a:r>
+              <a:rPr lang="en-US" dirty="0"/>
+              <a:t>.</a:t>
+            </a:r>
+          </a:p>
+          <a:p>
+            <a:r>
+              <a:rPr lang="en-US" dirty="0"/>
+              <a:t>Like CPU, </a:t>
+            </a:r>
+            <a:r>
+              <a:rPr lang="en-US" dirty="0">
+                <a:solidFill>
+                  <a:srgbClr val="FF0000"/>
+                </a:solidFill>
+              </a:rPr>
+              <a:t>pods will never be scheduled if they require more resources than the capacity of a node</a:t>
+            </a:r>
+            <a:r>
+              <a:rPr lang="en-US" dirty="0"/>
+              <a:t>. Unlike CPU, memory is not compressible. You can’t make memory run slower or faster like CPU or network throttling. Pods will be terminated if it reaches the memory limit.</a:t>
+            </a:r>
+          </a:p>
+          <a:p>
+            <a:endParaRPr lang="pl-PL" dirty="0"/>
+          </a:p>
+        </p:txBody>
+      </p:sp>
+    </p:spTree>
+    <p:extLst>
+      <p:ext uri="{BB962C8B-B14F-4D97-AF65-F5344CB8AC3E}">
+        <p14:creationId xmlns:p14="http://schemas.microsoft.com/office/powerpoint/2010/main" val="3653138814"/>
+      </p:ext>
+    </p:extLst>
+  </p:cSld>
+  <p:clrMapOvr>
+    <a:masterClrMapping/>
+  </p:clrMapOvr>
+</p:sld>
+</file>
+
+<file path=ppt/slides/slide9.xml><?xml version="1.0" encoding="utf-8"?>
+<p:sld xmlns:a="http://schemas.openxmlformats.org/drawingml/2006/main" xmlns:r="http://schemas.openxmlformats.org/officeDocument/2006/relationships" xmlns:p="http://schemas.openxmlformats.org/presentationml/2006/main">
+  <p:cSld>
+    <p:spTree>
+      <p:nvGrpSpPr>
+        <p:cNvPr id="1" name=""/>
+        <p:cNvGrpSpPr/>
+        <p:nvPr/>
+      </p:nvGrpSpPr>
+      <p:grpSpPr>
+        <a:xfrm>
+          <a:off x="0" y="0"/>
+          <a:ext cx="0" cy="0"/>
+          <a:chOff x="0" y="0"/>
+          <a:chExt cx="0" cy="0"/>
+        </a:xfrm>
+      </p:grpSpPr>
+      <p:sp>
+        <p:nvSpPr>
+          <p:cNvPr id="2" name="Tytuł 1"/>
+          <p:cNvSpPr>
+            <a:spLocks noGrp="1"/>
+          </p:cNvSpPr>
+          <p:nvPr>
+            <p:ph type="title"/>
+          </p:nvPr>
+        </p:nvSpPr>
+        <p:spPr/>
+        <p:txBody>
+          <a:bodyPr/>
+          <a:lstStyle/>
+          <a:p>
+            <a:r>
               <a:rPr lang="pl-PL" dirty="0" err="1" smtClean="0"/>
               <a:t>Limits</a:t>
             </a:r>
@@ -8957,883 +9834,6 @@
   <p:clrMapOvr>
     <a:masterClrMapping/>
   </p:clrMapOvr>
-</p:sld>
-</file>
-
-<file path=ppt/slides/slide8.xml><?xml version="1.0" encoding="utf-8"?>
-<p:sld xmlns:a="http://schemas.openxmlformats.org/drawingml/2006/main" xmlns:r="http://schemas.openxmlformats.org/officeDocument/2006/relationships" xmlns:p="http://schemas.openxmlformats.org/presentationml/2006/main">
-  <p:cSld>
-    <p:spTree>
-      <p:nvGrpSpPr>
-        <p:cNvPr id="1" name=""/>
-        <p:cNvGrpSpPr/>
-        <p:nvPr/>
-      </p:nvGrpSpPr>
-      <p:grpSpPr>
-        <a:xfrm>
-          <a:off x="0" y="0"/>
-          <a:ext cx="0" cy="0"/>
-          <a:chOff x="0" y="0"/>
-          <a:chExt cx="0" cy="0"/>
-        </a:xfrm>
-      </p:grpSpPr>
-      <p:sp>
-        <p:nvSpPr>
-          <p:cNvPr id="2" name="Tytuł 1"/>
-          <p:cNvSpPr>
-            <a:spLocks noGrp="1"/>
-          </p:cNvSpPr>
-          <p:nvPr>
-            <p:ph type="title"/>
-          </p:nvPr>
-        </p:nvSpPr>
-        <p:spPr/>
-        <p:txBody>
-          <a:bodyPr/>
-          <a:lstStyle/>
-          <a:p>
-            <a:r>
-              <a:rPr lang="pl-PL" dirty="0" err="1" smtClean="0"/>
-              <a:t>Container</a:t>
-            </a:r>
-            <a:r>
-              <a:rPr lang="pl-PL" dirty="0" smtClean="0"/>
-              <a:t> </a:t>
-            </a:r>
-            <a:r>
-              <a:rPr lang="pl-PL" dirty="0" err="1" smtClean="0"/>
-              <a:t>limits</a:t>
-            </a:r>
-            <a:endParaRPr lang="pl-PL" dirty="0"/>
-          </a:p>
-        </p:txBody>
-      </p:sp>
-      <p:sp>
-        <p:nvSpPr>
-          <p:cNvPr id="3" name="Symbol zastępczy zawartości 2"/>
-          <p:cNvSpPr>
-            <a:spLocks noGrp="1"/>
-          </p:cNvSpPr>
-          <p:nvPr>
-            <p:ph idx="1"/>
-          </p:nvPr>
-        </p:nvSpPr>
-        <p:spPr>
-          <a:xfrm>
-            <a:off x="502920" y="530352"/>
-            <a:ext cx="4069080" cy="3258688"/>
-          </a:xfrm>
-        </p:spPr>
-        <p:txBody>
-          <a:bodyPr>
-            <a:normAutofit/>
-          </a:bodyPr>
-          <a:lstStyle/>
-          <a:p>
-            <a:pPr marL="0" indent="0">
-              <a:buNone/>
-            </a:pPr>
-            <a:r>
-              <a:rPr lang="pl-PL" sz="1900" dirty="0" err="1">
-                <a:solidFill>
-                  <a:srgbClr val="FF0000"/>
-                </a:solidFill>
-              </a:rPr>
-              <a:t>apiVersion</a:t>
-            </a:r>
-            <a:r>
-              <a:rPr lang="pl-PL" sz="1900" dirty="0">
-                <a:solidFill>
-                  <a:srgbClr val="FF0000"/>
-                </a:solidFill>
-              </a:rPr>
-              <a:t>: v1</a:t>
-            </a:r>
-          </a:p>
-          <a:p>
-            <a:pPr marL="0" indent="0">
-              <a:buNone/>
-            </a:pPr>
-            <a:r>
-              <a:rPr lang="pl-PL" sz="1900" dirty="0" err="1">
-                <a:solidFill>
-                  <a:srgbClr val="FF0000"/>
-                </a:solidFill>
-              </a:rPr>
-              <a:t>kind</a:t>
-            </a:r>
-            <a:r>
-              <a:rPr lang="pl-PL" sz="1900" dirty="0">
-                <a:solidFill>
-                  <a:srgbClr val="FF0000"/>
-                </a:solidFill>
-              </a:rPr>
-              <a:t>: Pod</a:t>
-            </a:r>
-          </a:p>
-          <a:p>
-            <a:pPr marL="0" indent="0">
-              <a:buNone/>
-            </a:pPr>
-            <a:r>
-              <a:rPr lang="pl-PL" sz="1900" dirty="0" err="1">
-                <a:solidFill>
-                  <a:srgbClr val="FF0000"/>
-                </a:solidFill>
-              </a:rPr>
-              <a:t>metadata</a:t>
-            </a:r>
-            <a:r>
-              <a:rPr lang="pl-PL" sz="1900" dirty="0">
-                <a:solidFill>
-                  <a:srgbClr val="FF0000"/>
-                </a:solidFill>
-              </a:rPr>
-              <a:t>:</a:t>
-            </a:r>
-          </a:p>
-          <a:p>
-            <a:pPr marL="0" indent="0">
-              <a:buNone/>
-            </a:pPr>
-            <a:r>
-              <a:rPr lang="pl-PL" sz="1900" dirty="0">
-                <a:solidFill>
-                  <a:srgbClr val="FF0000"/>
-                </a:solidFill>
-              </a:rPr>
-              <a:t>  </a:t>
-            </a:r>
-            <a:r>
-              <a:rPr lang="pl-PL" sz="1900" dirty="0" err="1">
-                <a:solidFill>
-                  <a:srgbClr val="FF0000"/>
-                </a:solidFill>
-              </a:rPr>
-              <a:t>name</a:t>
-            </a:r>
-            <a:r>
-              <a:rPr lang="pl-PL" sz="1900" dirty="0">
-                <a:solidFill>
-                  <a:srgbClr val="FF0000"/>
-                </a:solidFill>
-              </a:rPr>
-              <a:t>: pod-quota-1</a:t>
-            </a:r>
-          </a:p>
-          <a:p>
-            <a:pPr marL="0" indent="0">
-              <a:buNone/>
-            </a:pPr>
-            <a:r>
-              <a:rPr lang="pl-PL" sz="1900" dirty="0">
-                <a:solidFill>
-                  <a:srgbClr val="FF0000"/>
-                </a:solidFill>
-              </a:rPr>
-              <a:t>spec:</a:t>
-            </a:r>
-          </a:p>
-          <a:p>
-            <a:pPr marL="0" indent="0">
-              <a:buNone/>
-            </a:pPr>
-            <a:r>
-              <a:rPr lang="pl-PL" sz="1900" dirty="0">
-                <a:solidFill>
-                  <a:srgbClr val="FF0000"/>
-                </a:solidFill>
-              </a:rPr>
-              <a:t>  </a:t>
-            </a:r>
-            <a:r>
-              <a:rPr lang="pl-PL" sz="1900" dirty="0" err="1">
-                <a:solidFill>
-                  <a:srgbClr val="FF0000"/>
-                </a:solidFill>
-              </a:rPr>
-              <a:t>containers</a:t>
-            </a:r>
-            <a:r>
-              <a:rPr lang="pl-PL" sz="1900" dirty="0">
-                <a:solidFill>
-                  <a:srgbClr val="FF0000"/>
-                </a:solidFill>
-              </a:rPr>
-              <a:t>:</a:t>
-            </a:r>
-          </a:p>
-          <a:p>
-            <a:pPr marL="0" indent="0">
-              <a:buNone/>
-            </a:pPr>
-            <a:r>
-              <a:rPr lang="pl-PL" sz="1900" dirty="0">
-                <a:solidFill>
-                  <a:srgbClr val="FF0000"/>
-                </a:solidFill>
-              </a:rPr>
-              <a:t>  - </a:t>
-            </a:r>
-            <a:r>
-              <a:rPr lang="pl-PL" sz="1900" dirty="0" err="1">
-                <a:solidFill>
-                  <a:srgbClr val="FF0000"/>
-                </a:solidFill>
-              </a:rPr>
-              <a:t>name</a:t>
-            </a:r>
-            <a:r>
-              <a:rPr lang="pl-PL" sz="1900" dirty="0">
-                <a:solidFill>
-                  <a:srgbClr val="FF0000"/>
-                </a:solidFill>
-              </a:rPr>
-              <a:t>: pod-quota-1</a:t>
-            </a:r>
-          </a:p>
-          <a:p>
-            <a:pPr marL="0" indent="0">
-              <a:buNone/>
-            </a:pPr>
-            <a:r>
-              <a:rPr lang="pl-PL" sz="1900" dirty="0">
-                <a:solidFill>
-                  <a:srgbClr val="FF0000"/>
-                </a:solidFill>
-              </a:rPr>
-              <a:t>    image: </a:t>
-            </a:r>
-            <a:r>
-              <a:rPr lang="pl-PL" sz="1900" dirty="0" err="1" smtClean="0">
-                <a:solidFill>
-                  <a:srgbClr val="FF0000"/>
-                </a:solidFill>
-              </a:rPr>
-              <a:t>nginx</a:t>
-            </a:r>
-            <a:endParaRPr lang="pl-PL" sz="1900" dirty="0" smtClean="0">
-              <a:solidFill>
-                <a:srgbClr val="FF0000"/>
-              </a:solidFill>
-            </a:endParaRPr>
-          </a:p>
-          <a:p>
-            <a:endParaRPr lang="pl-PL" dirty="0"/>
-          </a:p>
-        </p:txBody>
-      </p:sp>
-      <p:sp>
-        <p:nvSpPr>
-          <p:cNvPr id="6" name="Prostokąt 5"/>
-          <p:cNvSpPr/>
-          <p:nvPr/>
-        </p:nvSpPr>
-        <p:spPr>
-          <a:xfrm>
-            <a:off x="4139952" y="692696"/>
-            <a:ext cx="4572000" cy="4524315"/>
-          </a:xfrm>
-          <a:prstGeom prst="rect">
-            <a:avLst/>
-          </a:prstGeom>
-        </p:spPr>
-        <p:txBody>
-          <a:bodyPr>
-            <a:spAutoFit/>
-          </a:bodyPr>
-          <a:lstStyle/>
-          <a:p>
-            <a:r>
-              <a:rPr lang="pl-PL" dirty="0" err="1">
-                <a:solidFill>
-                  <a:schemeClr val="accent4">
-                    <a:lumMod val="50000"/>
-                  </a:schemeClr>
-                </a:solidFill>
-              </a:rPr>
-              <a:t>apiVersion</a:t>
-            </a:r>
-            <a:r>
-              <a:rPr lang="pl-PL" dirty="0">
-                <a:solidFill>
-                  <a:schemeClr val="accent4">
-                    <a:lumMod val="50000"/>
-                  </a:schemeClr>
-                </a:solidFill>
-              </a:rPr>
-              <a:t>: v1</a:t>
-            </a:r>
-          </a:p>
-          <a:p>
-            <a:r>
-              <a:rPr lang="pl-PL" dirty="0" err="1">
-                <a:solidFill>
-                  <a:schemeClr val="accent4">
-                    <a:lumMod val="50000"/>
-                  </a:schemeClr>
-                </a:solidFill>
-              </a:rPr>
-              <a:t>kind</a:t>
-            </a:r>
-            <a:r>
-              <a:rPr lang="pl-PL" dirty="0">
-                <a:solidFill>
-                  <a:schemeClr val="accent4">
-                    <a:lumMod val="50000"/>
-                  </a:schemeClr>
-                </a:solidFill>
-              </a:rPr>
-              <a:t>: Pod</a:t>
-            </a:r>
-          </a:p>
-          <a:p>
-            <a:r>
-              <a:rPr lang="pl-PL" dirty="0" err="1">
-                <a:solidFill>
-                  <a:schemeClr val="accent4">
-                    <a:lumMod val="50000"/>
-                  </a:schemeClr>
-                </a:solidFill>
-              </a:rPr>
-              <a:t>metadata</a:t>
-            </a:r>
-            <a:r>
-              <a:rPr lang="pl-PL" dirty="0">
-                <a:solidFill>
-                  <a:schemeClr val="accent4">
-                    <a:lumMod val="50000"/>
-                  </a:schemeClr>
-                </a:solidFill>
-              </a:rPr>
-              <a:t>:</a:t>
-            </a:r>
-          </a:p>
-          <a:p>
-            <a:r>
-              <a:rPr lang="pl-PL" dirty="0">
-                <a:solidFill>
-                  <a:schemeClr val="accent4">
-                    <a:lumMod val="50000"/>
-                  </a:schemeClr>
-                </a:solidFill>
-              </a:rPr>
-              <a:t>  </a:t>
-            </a:r>
-            <a:r>
-              <a:rPr lang="pl-PL" dirty="0" err="1">
-                <a:solidFill>
-                  <a:schemeClr val="accent4">
-                    <a:lumMod val="50000"/>
-                  </a:schemeClr>
-                </a:solidFill>
-              </a:rPr>
-              <a:t>name</a:t>
-            </a:r>
-            <a:r>
-              <a:rPr lang="pl-PL" dirty="0">
-                <a:solidFill>
-                  <a:schemeClr val="accent4">
-                    <a:lumMod val="50000"/>
-                  </a:schemeClr>
-                </a:solidFill>
-              </a:rPr>
-              <a:t>: pod-quota-2</a:t>
-            </a:r>
-          </a:p>
-          <a:p>
-            <a:r>
-              <a:rPr lang="pl-PL" dirty="0">
-                <a:solidFill>
-                  <a:schemeClr val="accent4">
-                    <a:lumMod val="50000"/>
-                  </a:schemeClr>
-                </a:solidFill>
-              </a:rPr>
-              <a:t>spec:</a:t>
-            </a:r>
-          </a:p>
-          <a:p>
-            <a:r>
-              <a:rPr lang="pl-PL" dirty="0">
-                <a:solidFill>
-                  <a:schemeClr val="accent4">
-                    <a:lumMod val="50000"/>
-                  </a:schemeClr>
-                </a:solidFill>
-              </a:rPr>
-              <a:t>  </a:t>
-            </a:r>
-            <a:r>
-              <a:rPr lang="pl-PL" dirty="0" err="1">
-                <a:solidFill>
-                  <a:schemeClr val="accent4">
-                    <a:lumMod val="50000"/>
-                  </a:schemeClr>
-                </a:solidFill>
-              </a:rPr>
-              <a:t>containers</a:t>
-            </a:r>
-            <a:r>
-              <a:rPr lang="pl-PL" dirty="0">
-                <a:solidFill>
-                  <a:schemeClr val="accent4">
-                    <a:lumMod val="50000"/>
-                  </a:schemeClr>
-                </a:solidFill>
-              </a:rPr>
-              <a:t>:</a:t>
-            </a:r>
-          </a:p>
-          <a:p>
-            <a:r>
-              <a:rPr lang="pl-PL" dirty="0">
-                <a:solidFill>
-                  <a:schemeClr val="accent4">
-                    <a:lumMod val="50000"/>
-                  </a:schemeClr>
-                </a:solidFill>
-              </a:rPr>
-              <a:t>  - </a:t>
-            </a:r>
-            <a:r>
-              <a:rPr lang="pl-PL" dirty="0" err="1">
-                <a:solidFill>
-                  <a:schemeClr val="accent4">
-                    <a:lumMod val="50000"/>
-                  </a:schemeClr>
-                </a:solidFill>
-              </a:rPr>
-              <a:t>name</a:t>
-            </a:r>
-            <a:r>
-              <a:rPr lang="pl-PL" dirty="0">
-                <a:solidFill>
-                  <a:schemeClr val="accent4">
-                    <a:lumMod val="50000"/>
-                  </a:schemeClr>
-                </a:solidFill>
-              </a:rPr>
-              <a:t>: pod-quota-2</a:t>
-            </a:r>
-          </a:p>
-          <a:p>
-            <a:r>
-              <a:rPr lang="pl-PL" dirty="0">
-                <a:solidFill>
-                  <a:schemeClr val="accent4">
-                    <a:lumMod val="50000"/>
-                  </a:schemeClr>
-                </a:solidFill>
-              </a:rPr>
-              <a:t>    image: </a:t>
-            </a:r>
-            <a:r>
-              <a:rPr lang="pl-PL" dirty="0" err="1">
-                <a:solidFill>
-                  <a:schemeClr val="accent4">
-                    <a:lumMod val="50000"/>
-                  </a:schemeClr>
-                </a:solidFill>
-              </a:rPr>
-              <a:t>redis</a:t>
-            </a:r>
-            <a:endParaRPr lang="pl-PL" dirty="0">
-              <a:solidFill>
-                <a:schemeClr val="accent4">
-                  <a:lumMod val="50000"/>
-                </a:schemeClr>
-              </a:solidFill>
-            </a:endParaRPr>
-          </a:p>
-          <a:p>
-            <a:r>
-              <a:rPr lang="pl-PL" b="1" dirty="0">
-                <a:solidFill>
-                  <a:schemeClr val="accent4">
-                    <a:lumMod val="50000"/>
-                  </a:schemeClr>
-                </a:solidFill>
-              </a:rPr>
-              <a:t>    </a:t>
-            </a:r>
-            <a:r>
-              <a:rPr lang="pl-PL" b="1" dirty="0" err="1">
-                <a:solidFill>
-                  <a:schemeClr val="accent4">
-                    <a:lumMod val="50000"/>
-                  </a:schemeClr>
-                </a:solidFill>
-              </a:rPr>
-              <a:t>resources</a:t>
-            </a:r>
-            <a:r>
-              <a:rPr lang="pl-PL" b="1" dirty="0">
-                <a:solidFill>
-                  <a:schemeClr val="accent4">
-                    <a:lumMod val="50000"/>
-                  </a:schemeClr>
-                </a:solidFill>
-              </a:rPr>
-              <a:t>:</a:t>
-            </a:r>
-          </a:p>
-          <a:p>
-            <a:r>
-              <a:rPr lang="pl-PL" b="1" dirty="0">
-                <a:solidFill>
-                  <a:schemeClr val="accent4">
-                    <a:lumMod val="50000"/>
-                  </a:schemeClr>
-                </a:solidFill>
-              </a:rPr>
-              <a:t>      </a:t>
-            </a:r>
-            <a:r>
-              <a:rPr lang="pl-PL" b="1" dirty="0" err="1">
-                <a:solidFill>
-                  <a:schemeClr val="accent4">
-                    <a:lumMod val="50000"/>
-                  </a:schemeClr>
-                </a:solidFill>
-              </a:rPr>
-              <a:t>limits</a:t>
-            </a:r>
-            <a:r>
-              <a:rPr lang="pl-PL" b="1" dirty="0">
-                <a:solidFill>
-                  <a:schemeClr val="accent4">
-                    <a:lumMod val="50000"/>
-                  </a:schemeClr>
-                </a:solidFill>
-              </a:rPr>
-              <a:t>:</a:t>
-            </a:r>
-          </a:p>
-          <a:p>
-            <a:r>
-              <a:rPr lang="pl-PL" b="1" dirty="0">
-                <a:solidFill>
-                  <a:schemeClr val="accent4">
-                    <a:lumMod val="50000"/>
-                  </a:schemeClr>
-                </a:solidFill>
-              </a:rPr>
-              <a:t>        </a:t>
-            </a:r>
-            <a:r>
-              <a:rPr lang="pl-PL" b="1" dirty="0" err="1">
-                <a:solidFill>
-                  <a:schemeClr val="accent4">
-                    <a:lumMod val="50000"/>
-                  </a:schemeClr>
-                </a:solidFill>
-              </a:rPr>
-              <a:t>memory</a:t>
-            </a:r>
-            <a:r>
-              <a:rPr lang="pl-PL" b="1" dirty="0">
-                <a:solidFill>
-                  <a:schemeClr val="accent4">
-                    <a:lumMod val="50000"/>
-                  </a:schemeClr>
-                </a:solidFill>
-              </a:rPr>
-              <a:t>: "1Gi"</a:t>
-            </a:r>
-          </a:p>
-          <a:p>
-            <a:r>
-              <a:rPr lang="pl-PL" b="1" dirty="0">
-                <a:solidFill>
-                  <a:schemeClr val="accent4">
-                    <a:lumMod val="50000"/>
-                  </a:schemeClr>
-                </a:solidFill>
-              </a:rPr>
-              <a:t>        </a:t>
-            </a:r>
-            <a:r>
-              <a:rPr lang="pl-PL" b="1" dirty="0" err="1">
-                <a:solidFill>
-                  <a:schemeClr val="accent4">
-                    <a:lumMod val="50000"/>
-                  </a:schemeClr>
-                </a:solidFill>
-              </a:rPr>
-              <a:t>cpu</a:t>
-            </a:r>
-            <a:r>
-              <a:rPr lang="pl-PL" b="1" dirty="0">
-                <a:solidFill>
-                  <a:schemeClr val="accent4">
-                    <a:lumMod val="50000"/>
-                  </a:schemeClr>
-                </a:solidFill>
-              </a:rPr>
-              <a:t>: "800m"      </a:t>
-            </a:r>
-          </a:p>
-          <a:p>
-            <a:r>
-              <a:rPr lang="pl-PL" b="1" dirty="0">
-                <a:solidFill>
-                  <a:schemeClr val="accent4">
-                    <a:lumMod val="50000"/>
-                  </a:schemeClr>
-                </a:solidFill>
-              </a:rPr>
-              <a:t>      </a:t>
-            </a:r>
-            <a:r>
-              <a:rPr lang="pl-PL" b="1" dirty="0" err="1">
-                <a:solidFill>
-                  <a:schemeClr val="accent4">
-                    <a:lumMod val="50000"/>
-                  </a:schemeClr>
-                </a:solidFill>
-              </a:rPr>
-              <a:t>requests</a:t>
-            </a:r>
-            <a:r>
-              <a:rPr lang="pl-PL" b="1" dirty="0">
-                <a:solidFill>
-                  <a:schemeClr val="accent4">
-                    <a:lumMod val="50000"/>
-                  </a:schemeClr>
-                </a:solidFill>
-              </a:rPr>
-              <a:t>:</a:t>
-            </a:r>
-          </a:p>
-          <a:p>
-            <a:r>
-              <a:rPr lang="pl-PL" b="1" dirty="0">
-                <a:solidFill>
-                  <a:schemeClr val="accent4">
-                    <a:lumMod val="50000"/>
-                  </a:schemeClr>
-                </a:solidFill>
-              </a:rPr>
-              <a:t>        </a:t>
-            </a:r>
-            <a:r>
-              <a:rPr lang="pl-PL" b="1" dirty="0" err="1">
-                <a:solidFill>
-                  <a:schemeClr val="accent4">
-                    <a:lumMod val="50000"/>
-                  </a:schemeClr>
-                </a:solidFill>
-              </a:rPr>
-              <a:t>memory</a:t>
-            </a:r>
-            <a:r>
-              <a:rPr lang="pl-PL" b="1" dirty="0">
-                <a:solidFill>
-                  <a:schemeClr val="accent4">
-                    <a:lumMod val="50000"/>
-                  </a:schemeClr>
-                </a:solidFill>
-              </a:rPr>
-              <a:t>: "700Mi"</a:t>
-            </a:r>
-          </a:p>
-          <a:p>
-            <a:r>
-              <a:rPr lang="pl-PL" b="1" dirty="0">
-                <a:solidFill>
-                  <a:schemeClr val="accent4">
-                    <a:lumMod val="50000"/>
-                  </a:schemeClr>
-                </a:solidFill>
-              </a:rPr>
-              <a:t>        </a:t>
-            </a:r>
-            <a:r>
-              <a:rPr lang="pl-PL" b="1" dirty="0" err="1">
-                <a:solidFill>
-                  <a:schemeClr val="accent4">
-                    <a:lumMod val="50000"/>
-                  </a:schemeClr>
-                </a:solidFill>
-              </a:rPr>
-              <a:t>cpu</a:t>
-            </a:r>
-            <a:r>
-              <a:rPr lang="pl-PL" b="1" dirty="0">
-                <a:solidFill>
-                  <a:schemeClr val="accent4">
-                    <a:lumMod val="50000"/>
-                  </a:schemeClr>
-                </a:solidFill>
-              </a:rPr>
-              <a:t>: "400m"</a:t>
-            </a:r>
-          </a:p>
-          <a:p>
-            <a:r>
-              <a:rPr lang="pl-PL" dirty="0"/>
-              <a:t> </a:t>
-            </a:r>
-          </a:p>
-        </p:txBody>
-      </p:sp>
-    </p:spTree>
-    <p:extLst>
-      <p:ext uri="{BB962C8B-B14F-4D97-AF65-F5344CB8AC3E}">
-        <p14:creationId xmlns:p14="http://schemas.microsoft.com/office/powerpoint/2010/main" val="3781876501"/>
-      </p:ext>
-    </p:extLst>
-  </p:cSld>
-  <p:clrMapOvr>
-    <a:masterClrMapping/>
-  </p:clrMapOvr>
-  <p:timing>
-    <p:tnLst>
-      <p:par>
-        <p:cTn id="1" dur="indefinite" restart="never" nodeType="tmRoot"/>
-      </p:par>
-    </p:tnLst>
-  </p:timing>
-</p:sld>
-</file>
-
-<file path=ppt/slides/slide9.xml><?xml version="1.0" encoding="utf-8"?>
-<p:sld xmlns:a="http://schemas.openxmlformats.org/drawingml/2006/main" xmlns:r="http://schemas.openxmlformats.org/officeDocument/2006/relationships" xmlns:p="http://schemas.openxmlformats.org/presentationml/2006/main">
-  <p:cSld>
-    <p:spTree>
-      <p:nvGrpSpPr>
-        <p:cNvPr id="1" name=""/>
-        <p:cNvGrpSpPr/>
-        <p:nvPr/>
-      </p:nvGrpSpPr>
-      <p:grpSpPr>
-        <a:xfrm>
-          <a:off x="0" y="0"/>
-          <a:ext cx="0" cy="0"/>
-          <a:chOff x="0" y="0"/>
-          <a:chExt cx="0" cy="0"/>
-        </a:xfrm>
-      </p:grpSpPr>
-      <p:sp>
-        <p:nvSpPr>
-          <p:cNvPr id="2" name="Tytuł 1"/>
-          <p:cNvSpPr>
-            <a:spLocks noGrp="1"/>
-          </p:cNvSpPr>
-          <p:nvPr>
-            <p:ph type="title"/>
-          </p:nvPr>
-        </p:nvSpPr>
-        <p:spPr/>
-        <p:txBody>
-          <a:bodyPr/>
-          <a:lstStyle/>
-          <a:p>
-            <a:r>
-              <a:rPr lang="pl-PL" dirty="0" err="1" smtClean="0"/>
-              <a:t>Namespaces</a:t>
-            </a:r>
-            <a:endParaRPr lang="pl-PL" dirty="0"/>
-          </a:p>
-        </p:txBody>
-      </p:sp>
-      <p:sp>
-        <p:nvSpPr>
-          <p:cNvPr id="3" name="Symbol zastępczy zawartości 2"/>
-          <p:cNvSpPr>
-            <a:spLocks noGrp="1"/>
-          </p:cNvSpPr>
-          <p:nvPr>
-            <p:ph idx="1"/>
-          </p:nvPr>
-        </p:nvSpPr>
-        <p:spPr/>
-        <p:txBody>
-          <a:bodyPr>
-            <a:normAutofit fontScale="92500" lnSpcReduction="10000"/>
-          </a:bodyPr>
-          <a:lstStyle/>
-          <a:p>
-            <a:r>
-              <a:rPr lang="en-US" dirty="0"/>
-              <a:t>Beyond the individual container resources, you may want to investigate setting limits on namespaces. So what is a namespace? Namespaces can be used to define a cluster of applications, departments, or environments. Simply, Namespace refers to scope or grouping of objects in a Kubernetes </a:t>
-            </a:r>
-            <a:r>
-              <a:rPr lang="en-US" dirty="0" smtClean="0"/>
-              <a:t>cluster</a:t>
-            </a:r>
-            <a:endParaRPr lang="pl-PL" dirty="0" smtClean="0"/>
-          </a:p>
-          <a:p>
-            <a:endParaRPr lang="pl-PL" dirty="0" smtClean="0"/>
-          </a:p>
-          <a:p>
-            <a:r>
-              <a:rPr lang="en-US" dirty="0">
-                <a:solidFill>
-                  <a:srgbClr val="FF0000"/>
-                </a:solidFill>
-              </a:rPr>
-              <a:t>At the Namespace level, you can set up </a:t>
-            </a:r>
-            <a:r>
-              <a:rPr lang="en-US" dirty="0" err="1">
-                <a:solidFill>
-                  <a:srgbClr val="FF0000"/>
-                </a:solidFill>
-              </a:rPr>
-              <a:t>ResourceQuotas</a:t>
-            </a:r>
-            <a:r>
-              <a:rPr lang="en-US" dirty="0">
-                <a:solidFill>
-                  <a:srgbClr val="FF0000"/>
-                </a:solidFill>
-              </a:rPr>
-              <a:t> and </a:t>
-            </a:r>
-            <a:r>
-              <a:rPr lang="en-US" dirty="0" err="1">
-                <a:solidFill>
-                  <a:srgbClr val="FF0000"/>
-                </a:solidFill>
-              </a:rPr>
-              <a:t>LimitRanges</a:t>
-            </a:r>
-            <a:r>
-              <a:rPr lang="en-US" dirty="0">
-                <a:solidFill>
-                  <a:srgbClr val="FF0000"/>
-                </a:solidFill>
-              </a:rPr>
-              <a:t>.</a:t>
-            </a:r>
-            <a:endParaRPr lang="pl-PL" dirty="0">
-              <a:solidFill>
-                <a:srgbClr val="FF0000"/>
-              </a:solidFill>
-            </a:endParaRPr>
-          </a:p>
-        </p:txBody>
-      </p:sp>
-    </p:spTree>
-    <p:extLst>
-      <p:ext uri="{BB962C8B-B14F-4D97-AF65-F5344CB8AC3E}">
-        <p14:creationId xmlns:p14="http://schemas.microsoft.com/office/powerpoint/2010/main" val="194794197"/>
-      </p:ext>
-    </p:extLst>
-  </p:cSld>
-  <p:clrMapOvr>
-    <a:masterClrMapping/>
-  </p:clrMapOvr>
-  <p:timing>
-    <p:tnLst>
-      <p:par>
-        <p:cTn id="1" dur="indefinite" restart="never" nodeType="tmRoot"/>
-      </p:par>
-    </p:tnLst>
-  </p:timing>
 </p:sld>
 </file>
 

</xml_diff>

<commit_message>
adding photo and about me page
</commit_message>
<xml_diff>
--- a/examples/atwar/presentation/Kubernetes at war on Azure.pptx
+++ b/examples/atwar/presentation/Kubernetes at war on Azure.pptx
@@ -133,7 +133,7 @@
   </p:defaultTextStyle>
   <p:extLst>
     <p:ext uri="{EFAFB233-063F-42B5-8137-9DF3F51BA10A}">
-      <p15:sldGuideLst xmlns:p15="http://schemas.microsoft.com/office/powerpoint/2012/main">
+      <p15:sldGuideLst xmlns:p15="http://schemas.microsoft.com/office/powerpoint/2012/main" xmlns="">
         <p15:guide id="1" orient="horz" pos="2160">
           <p15:clr>
             <a:srgbClr val="A4A3A4"/>
@@ -450,7 +450,7 @@
           <a:p>
             <a:fld id="{2985609B-2F98-4665-80AE-902D6BB7ECF4}" type="datetimeFigureOut">
               <a:rPr lang="pl-PL" smtClean="0"/>
-              <a:t>23.10.2019</a:t>
+              <a:t>2019-11-02</a:t>
             </a:fld>
             <a:endParaRPr lang="pl-PL"/>
           </a:p>
@@ -625,7 +625,7 @@
           <a:p>
             <a:fld id="{2985609B-2F98-4665-80AE-902D6BB7ECF4}" type="datetimeFigureOut">
               <a:rPr lang="pl-PL" smtClean="0"/>
-              <a:t>23.10.2019</a:t>
+              <a:t>2019-11-02</a:t>
             </a:fld>
             <a:endParaRPr lang="pl-PL"/>
           </a:p>
@@ -800,7 +800,7 @@
           <a:p>
             <a:fld id="{2985609B-2F98-4665-80AE-902D6BB7ECF4}" type="datetimeFigureOut">
               <a:rPr lang="pl-PL" smtClean="0"/>
-              <a:t>23.10.2019</a:t>
+              <a:t>2019-11-02</a:t>
             </a:fld>
             <a:endParaRPr lang="pl-PL"/>
           </a:p>
@@ -975,7 +975,7 @@
           <a:p>
             <a:fld id="{2985609B-2F98-4665-80AE-902D6BB7ECF4}" type="datetimeFigureOut">
               <a:rPr lang="pl-PL" smtClean="0"/>
-              <a:t>23.10.2019</a:t>
+              <a:t>2019-11-02</a:t>
             </a:fld>
             <a:endParaRPr lang="pl-PL"/>
           </a:p>
@@ -1346,7 +1346,7 @@
           <a:p>
             <a:fld id="{2985609B-2F98-4665-80AE-902D6BB7ECF4}" type="datetimeFigureOut">
               <a:rPr lang="pl-PL" smtClean="0"/>
-              <a:t>23.10.2019</a:t>
+              <a:t>2019-11-02</a:t>
             </a:fld>
             <a:endParaRPr lang="pl-PL"/>
           </a:p>
@@ -1607,7 +1607,7 @@
           <a:p>
             <a:fld id="{2985609B-2F98-4665-80AE-902D6BB7ECF4}" type="datetimeFigureOut">
               <a:rPr lang="pl-PL" smtClean="0"/>
-              <a:t>23.10.2019</a:t>
+              <a:t>2019-11-02</a:t>
             </a:fld>
             <a:endParaRPr lang="pl-PL"/>
           </a:p>
@@ -1986,7 +1986,7 @@
           <a:p>
             <a:fld id="{2985609B-2F98-4665-80AE-902D6BB7ECF4}" type="datetimeFigureOut">
               <a:rPr lang="pl-PL" smtClean="0"/>
-              <a:t>23.10.2019</a:t>
+              <a:t>2019-11-02</a:t>
             </a:fld>
             <a:endParaRPr lang="pl-PL"/>
           </a:p>
@@ -2099,7 +2099,7 @@
           <a:p>
             <a:fld id="{2985609B-2F98-4665-80AE-902D6BB7ECF4}" type="datetimeFigureOut">
               <a:rPr lang="pl-PL" smtClean="0"/>
-              <a:t>23.10.2019</a:t>
+              <a:t>2019-11-02</a:t>
             </a:fld>
             <a:endParaRPr lang="pl-PL"/>
           </a:p>
@@ -2271,7 +2271,7 @@
           <a:p>
             <a:fld id="{2985609B-2F98-4665-80AE-902D6BB7ECF4}" type="datetimeFigureOut">
               <a:rPr lang="pl-PL" smtClean="0"/>
-              <a:t>23.10.2019</a:t>
+              <a:t>2019-11-02</a:t>
             </a:fld>
             <a:endParaRPr lang="pl-PL"/>
           </a:p>
@@ -2599,7 +2599,7 @@
           <a:p>
             <a:fld id="{2985609B-2F98-4665-80AE-902D6BB7ECF4}" type="datetimeFigureOut">
               <a:rPr lang="pl-PL" smtClean="0"/>
-              <a:t>23.10.2019</a:t>
+              <a:t>2019-11-02</a:t>
             </a:fld>
             <a:endParaRPr lang="pl-PL"/>
           </a:p>
@@ -2958,7 +2958,7 @@
           <a:p>
             <a:fld id="{2985609B-2F98-4665-80AE-902D6BB7ECF4}" type="datetimeFigureOut">
               <a:rPr lang="pl-PL" smtClean="0"/>
-              <a:t>23.10.2019</a:t>
+              <a:t>2019-11-02</a:t>
             </a:fld>
             <a:endParaRPr lang="pl-PL"/>
           </a:p>
@@ -3364,7 +3364,7 @@
           <a:p>
             <a:fld id="{2985609B-2F98-4665-80AE-902D6BB7ECF4}" type="datetimeFigureOut">
               <a:rPr lang="pl-PL" smtClean="0"/>
-              <a:t>23.10.2019</a:t>
+              <a:t>2019-11-02</a:t>
             </a:fld>
             <a:endParaRPr lang="pl-PL"/>
           </a:p>
@@ -6505,14 +6505,14 @@
                 <a:gridCol w="3299460">
                   <a:extLst>
                     <a:ext uri="{9D8B030D-6E8A-4147-A177-3AD203B41FA5}">
-                      <a16:colId xmlns:a16="http://schemas.microsoft.com/office/drawing/2014/main" val="20000"/>
+                      <a16:colId xmlns:a16="http://schemas.microsoft.com/office/drawing/2014/main" xmlns="" val="20000"/>
                     </a:ext>
                   </a:extLst>
                 </a:gridCol>
                 <a:gridCol w="3299460">
                   <a:extLst>
                     <a:ext uri="{9D8B030D-6E8A-4147-A177-3AD203B41FA5}">
-                      <a16:colId xmlns:a16="http://schemas.microsoft.com/office/drawing/2014/main" val="20001"/>
+                      <a16:colId xmlns:a16="http://schemas.microsoft.com/office/drawing/2014/main" xmlns="" val="20001"/>
                     </a:ext>
                   </a:extLst>
                 </a:gridCol>
@@ -6726,7 +6726,7 @@
                 </a:tc>
                 <a:extLst>
                   <a:ext uri="{0D108BD9-81ED-4DB2-BD59-A6C34878D82A}">
-                    <a16:rowId xmlns:a16="http://schemas.microsoft.com/office/drawing/2014/main" val="10000"/>
+                    <a16:rowId xmlns:a16="http://schemas.microsoft.com/office/drawing/2014/main" xmlns="" val="10000"/>
                   </a:ext>
                 </a:extLst>
               </a:tr>
@@ -6760,14 +6760,14 @@
                 <a:gridCol w="3299460">
                   <a:extLst>
                     <a:ext uri="{9D8B030D-6E8A-4147-A177-3AD203B41FA5}">
-                      <a16:colId xmlns:a16="http://schemas.microsoft.com/office/drawing/2014/main" val="20000"/>
+                      <a16:colId xmlns:a16="http://schemas.microsoft.com/office/drawing/2014/main" xmlns="" val="20000"/>
                     </a:ext>
                   </a:extLst>
                 </a:gridCol>
                 <a:gridCol w="3299460">
                   <a:extLst>
                     <a:ext uri="{9D8B030D-6E8A-4147-A177-3AD203B41FA5}">
-                      <a16:colId xmlns:a16="http://schemas.microsoft.com/office/drawing/2014/main" val="20001"/>
+                      <a16:colId xmlns:a16="http://schemas.microsoft.com/office/drawing/2014/main" xmlns="" val="20001"/>
                     </a:ext>
                   </a:extLst>
                 </a:gridCol>
@@ -6897,7 +6897,7 @@
                 </a:tc>
                 <a:extLst>
                   <a:ext uri="{0D108BD9-81ED-4DB2-BD59-A6C34878D82A}">
-                    <a16:rowId xmlns:a16="http://schemas.microsoft.com/office/drawing/2014/main" val="10000"/>
+                    <a16:rowId xmlns:a16="http://schemas.microsoft.com/office/drawing/2014/main" xmlns="" val="10000"/>
                   </a:ext>
                 </a:extLst>
               </a:tr>
@@ -7014,7 +7014,7 @@
                 </a:tc>
                 <a:extLst>
                   <a:ext uri="{0D108BD9-81ED-4DB2-BD59-A6C34878D82A}">
-                    <a16:rowId xmlns:a16="http://schemas.microsoft.com/office/drawing/2014/main" val="10001"/>
+                    <a16:rowId xmlns:a16="http://schemas.microsoft.com/office/drawing/2014/main" xmlns="" val="10001"/>
                   </a:ext>
                 </a:extLst>
               </a:tr>
@@ -7147,7 +7147,15 @@
             </a:r>
             <a:r>
               <a:rPr lang="en-US" dirty="0"/>
-              <a:t>holds professional certificates: MCP, MCSA: SQL Server 2012/2014, MCSE: Data Management and Analytics, MCSA: Cloud Platform, MCSE: Cloud Platform and Infrastructure , MPP Data Science , Microsoft Certified: Azure Administrator Associate , Microsoft Certified: Azure Data Scientist Associate</a:t>
+              <a:t>holds professional certificates: MCP, MCSA: SQL Server 2012/2014, MCSE: Data Management and Analytics, MCSA: Cloud Platform, MCSE: Cloud Platform and Infrastructure , MPP Data Science , Microsoft Certified: Azure Administrator Associate , </a:t>
+            </a:r>
+            <a:r>
+              <a:rPr lang="en-US" dirty="0" smtClean="0"/>
+              <a:t>Microsoft </a:t>
+            </a:r>
+            <a:r>
+              <a:rPr lang="en-US" dirty="0"/>
+              <a:t>Certified: Azure Data Scientist Associate</a:t>
             </a:r>
             <a:endParaRPr lang="pl-PL" dirty="0"/>
           </a:p>
@@ -7196,6 +7204,60 @@
           </a:p>
         </p:txBody>
       </p:sp>
+      <p:pic>
+        <p:nvPicPr>
+          <p:cNvPr id="1027" name="Picture 3"/>
+          <p:cNvPicPr>
+            <a:picLocks noChangeAspect="1" noChangeArrowheads="1"/>
+          </p:cNvPicPr>
+          <p:nvPr/>
+        </p:nvPicPr>
+        <p:blipFill>
+          <a:blip r:embed="rId2" cstate="print">
+            <a:extLst>
+              <a:ext uri="{28A0092B-C50C-407E-A947-70E740481C1C}">
+                <a14:useLocalDpi xmlns:a14="http://schemas.microsoft.com/office/drawing/2010/main" val="0"/>
+              </a:ext>
+            </a:extLst>
+          </a:blip>
+          <a:srcRect/>
+          <a:stretch>
+            <a:fillRect/>
+          </a:stretch>
+        </p:blipFill>
+        <p:spPr bwMode="auto">
+          <a:xfrm>
+            <a:off x="7065851" y="3789040"/>
+            <a:ext cx="1359260" cy="2083126"/>
+          </a:xfrm>
+          <a:prstGeom prst="rect">
+            <a:avLst/>
+          </a:prstGeom>
+          <a:noFill/>
+          <a:ln>
+            <a:noFill/>
+          </a:ln>
+          <a:extLst>
+            <a:ext uri="{909E8E84-426E-40DD-AFC4-6F175D3DCCD1}">
+              <a14:hiddenFill xmlns:a14="http://schemas.microsoft.com/office/drawing/2010/main">
+                <a:solidFill>
+                  <a:schemeClr val="accent1"/>
+                </a:solidFill>
+              </a14:hiddenFill>
+            </a:ext>
+            <a:ext uri="{91240B29-F687-4F45-9708-019B960494DF}">
+              <a14:hiddenLine xmlns:a14="http://schemas.microsoft.com/office/drawing/2010/main" w="9525">
+                <a:solidFill>
+                  <a:schemeClr val="tx1"/>
+                </a:solidFill>
+                <a:miter lim="800000"/>
+                <a:headEnd/>
+                <a:tailEnd/>
+              </a14:hiddenLine>
+            </a:ext>
+          </a:extLst>
+        </p:spPr>
+      </p:pic>
     </p:spTree>
     <p:extLst>
       <p:ext uri="{BB962C8B-B14F-4D97-AF65-F5344CB8AC3E}">
@@ -8777,7 +8839,7 @@
           <p:cNvPr id="2" name="Tytuł 1">
             <a:extLst>
               <a:ext uri="{FF2B5EF4-FFF2-40B4-BE49-F238E27FC236}">
-                <a16:creationId xmlns:a16="http://schemas.microsoft.com/office/drawing/2014/main" id="{E2B3E769-EA3D-4BD1-90C7-29852D33D2B0}"/>
+                <a16:creationId xmlns:a16="http://schemas.microsoft.com/office/drawing/2014/main" xmlns="" id="{E2B3E769-EA3D-4BD1-90C7-29852D33D2B0}"/>
               </a:ext>
             </a:extLst>
           </p:cNvPr>
@@ -8828,7 +8890,7 @@
           <p:cNvPr id="3" name="Symbol zastępczy zawartości 2">
             <a:extLst>
               <a:ext uri="{FF2B5EF4-FFF2-40B4-BE49-F238E27FC236}">
-                <a16:creationId xmlns:a16="http://schemas.microsoft.com/office/drawing/2014/main" id="{9F21D483-75C8-43CA-B656-D5F42F9B6948}"/>
+                <a16:creationId xmlns:a16="http://schemas.microsoft.com/office/drawing/2014/main" xmlns="" id="{9F21D483-75C8-43CA-B656-D5F42F9B6948}"/>
               </a:ext>
             </a:extLst>
           </p:cNvPr>
@@ -8986,7 +9048,7 @@
           <p:cNvPr id="2" name="Tytuł 1">
             <a:extLst>
               <a:ext uri="{FF2B5EF4-FFF2-40B4-BE49-F238E27FC236}">
-                <a16:creationId xmlns:a16="http://schemas.microsoft.com/office/drawing/2014/main" id="{52954B61-983B-4682-A8E2-0BA9EE32C422}"/>
+                <a16:creationId xmlns:a16="http://schemas.microsoft.com/office/drawing/2014/main" xmlns="" id="{52954B61-983B-4682-A8E2-0BA9EE32C422}"/>
               </a:ext>
             </a:extLst>
           </p:cNvPr>
@@ -9023,7 +9085,7 @@
           <p:cNvPr id="3" name="Symbol zastępczy zawartości 2">
             <a:extLst>
               <a:ext uri="{FF2B5EF4-FFF2-40B4-BE49-F238E27FC236}">
-                <a16:creationId xmlns:a16="http://schemas.microsoft.com/office/drawing/2014/main" id="{98C5E178-F058-4CD3-9551-9408EA728AF3}"/>
+                <a16:creationId xmlns:a16="http://schemas.microsoft.com/office/drawing/2014/main" xmlns="" id="{98C5E178-F058-4CD3-9551-9408EA728AF3}"/>
               </a:ext>
             </a:extLst>
           </p:cNvPr>
@@ -9118,6 +9180,10 @@
             <a:r>
               <a:rPr lang="pl-PL" dirty="0" err="1"/>
               <a:t>minutes</a:t>
+            </a:r>
+            <a:r>
+              <a:rPr lang="pl-PL" dirty="0"/>
+              <a:t/>
             </a:r>
             <a:br>
               <a:rPr lang="pl-PL" dirty="0"/>

</xml_diff>